<commit_message>
Added cartoonized version of picture 1. Already checking with Ole that this is in line with policies Export png from slide 3 and import into docx
</commit_message>
<xml_diff>
--- a/Fig1-ANIMA-goal.pptx
+++ b/Fig1-ANIMA-goal.pptx
@@ -1,20 +1,133 @@
 
 <file path=ppt/presentation.xml><?xml version="1.0" encoding="utf-8"?>
-<p:presentation xmlns:a="http://schemas.openxmlformats.org/drawingml/2006/main" xmlns:p="http://schemas.openxmlformats.org/presentationml/2006/main" xmlns:r="http://schemas.openxmlformats.org/officeDocument/2006/relationships" xmlns:p14="http://schemas.microsoft.com/office/powerpoint/2010/main" xmlns:p15="http://schemas.microsoft.com/office/powerpoint/2012/main" xmlns:mc="http://schemas.openxmlformats.org/markup-compatibility/2006">
+<p:presentation xmlns:a="http://schemas.openxmlformats.org/drawingml/2006/main" xmlns:r="http://schemas.openxmlformats.org/officeDocument/2006/relationships" xmlns:p="http://schemas.openxmlformats.org/presentationml/2006/main" saveSubsetFonts="1">
   <p:sldMasterIdLst>
-    <p:sldMasterId id="2147483648" r:id="rId2"/>
-    <p:sldMasterId id="2147483661" r:id="rId3"/>
+    <p:sldMasterId id="2147483648" r:id="rId1"/>
+    <p:sldMasterId id="2147483661" r:id="rId2"/>
   </p:sldMasterIdLst>
   <p:sldIdLst>
-    <p:sldId id="256" r:id="rId4"/>
+    <p:sldId id="256" r:id="rId3"/>
+    <p:sldId id="257" r:id="rId4"/>
+    <p:sldId id="258" r:id="rId5"/>
   </p:sldIdLst>
-  <p:sldSz cx="7772400" cy="4379912"/>
+  <p:sldSz cx="7772400" cy="4379913"/>
   <p:notesSz cx="7772400" cy="10058400"/>
+  <p:defaultTextStyle>
+    <a:defPPr>
+      <a:defRPr lang="en-US"/>
+    </a:defPPr>
+    <a:lvl1pPr marL="0" algn="l" defTabSz="914400" rtl="0" eaLnBrk="1" latinLnBrk="0" hangingPunct="1">
+      <a:defRPr sz="1800" kern="1200">
+        <a:solidFill>
+          <a:schemeClr val="tx1"/>
+        </a:solidFill>
+        <a:latin typeface="+mn-lt"/>
+        <a:ea typeface="+mn-ea"/>
+        <a:cs typeface="+mn-cs"/>
+      </a:defRPr>
+    </a:lvl1pPr>
+    <a:lvl2pPr marL="457200" algn="l" defTabSz="914400" rtl="0" eaLnBrk="1" latinLnBrk="0" hangingPunct="1">
+      <a:defRPr sz="1800" kern="1200">
+        <a:solidFill>
+          <a:schemeClr val="tx1"/>
+        </a:solidFill>
+        <a:latin typeface="+mn-lt"/>
+        <a:ea typeface="+mn-ea"/>
+        <a:cs typeface="+mn-cs"/>
+      </a:defRPr>
+    </a:lvl2pPr>
+    <a:lvl3pPr marL="914400" algn="l" defTabSz="914400" rtl="0" eaLnBrk="1" latinLnBrk="0" hangingPunct="1">
+      <a:defRPr sz="1800" kern="1200">
+        <a:solidFill>
+          <a:schemeClr val="tx1"/>
+        </a:solidFill>
+        <a:latin typeface="+mn-lt"/>
+        <a:ea typeface="+mn-ea"/>
+        <a:cs typeface="+mn-cs"/>
+      </a:defRPr>
+    </a:lvl3pPr>
+    <a:lvl4pPr marL="1371600" algn="l" defTabSz="914400" rtl="0" eaLnBrk="1" latinLnBrk="0" hangingPunct="1">
+      <a:defRPr sz="1800" kern="1200">
+        <a:solidFill>
+          <a:schemeClr val="tx1"/>
+        </a:solidFill>
+        <a:latin typeface="+mn-lt"/>
+        <a:ea typeface="+mn-ea"/>
+        <a:cs typeface="+mn-cs"/>
+      </a:defRPr>
+    </a:lvl4pPr>
+    <a:lvl5pPr marL="1828800" algn="l" defTabSz="914400" rtl="0" eaLnBrk="1" latinLnBrk="0" hangingPunct="1">
+      <a:defRPr sz="1800" kern="1200">
+        <a:solidFill>
+          <a:schemeClr val="tx1"/>
+        </a:solidFill>
+        <a:latin typeface="+mn-lt"/>
+        <a:ea typeface="+mn-ea"/>
+        <a:cs typeface="+mn-cs"/>
+      </a:defRPr>
+    </a:lvl5pPr>
+    <a:lvl6pPr marL="2286000" algn="l" defTabSz="914400" rtl="0" eaLnBrk="1" latinLnBrk="0" hangingPunct="1">
+      <a:defRPr sz="1800" kern="1200">
+        <a:solidFill>
+          <a:schemeClr val="tx1"/>
+        </a:solidFill>
+        <a:latin typeface="+mn-lt"/>
+        <a:ea typeface="+mn-ea"/>
+        <a:cs typeface="+mn-cs"/>
+      </a:defRPr>
+    </a:lvl6pPr>
+    <a:lvl7pPr marL="2743200" algn="l" defTabSz="914400" rtl="0" eaLnBrk="1" latinLnBrk="0" hangingPunct="1">
+      <a:defRPr sz="1800" kern="1200">
+        <a:solidFill>
+          <a:schemeClr val="tx1"/>
+        </a:solidFill>
+        <a:latin typeface="+mn-lt"/>
+        <a:ea typeface="+mn-ea"/>
+        <a:cs typeface="+mn-cs"/>
+      </a:defRPr>
+    </a:lvl7pPr>
+    <a:lvl8pPr marL="3200400" algn="l" defTabSz="914400" rtl="0" eaLnBrk="1" latinLnBrk="0" hangingPunct="1">
+      <a:defRPr sz="1800" kern="1200">
+        <a:solidFill>
+          <a:schemeClr val="tx1"/>
+        </a:solidFill>
+        <a:latin typeface="+mn-lt"/>
+        <a:ea typeface="+mn-ea"/>
+        <a:cs typeface="+mn-cs"/>
+      </a:defRPr>
+    </a:lvl8pPr>
+    <a:lvl9pPr marL="3657600" algn="l" defTabSz="914400" rtl="0" eaLnBrk="1" latinLnBrk="0" hangingPunct="1">
+      <a:defRPr sz="1800" kern="1200">
+        <a:solidFill>
+          <a:schemeClr val="tx1"/>
+        </a:solidFill>
+        <a:latin typeface="+mn-lt"/>
+        <a:ea typeface="+mn-ea"/>
+        <a:cs typeface="+mn-cs"/>
+      </a:defRPr>
+    </a:lvl9pPr>
+  </p:defaultTextStyle>
+  <p:extLst>
+    <p:ext uri="{EFAFB233-063F-42B5-8137-9DF3F51BA10A}">
+      <p15:sldGuideLst xmlns:p15="http://schemas.microsoft.com/office/powerpoint/2012/main">
+        <p15:guide id="1" orient="horz" pos="2672" userDrawn="1">
+          <p15:clr>
+            <a:srgbClr val="A4A3A4"/>
+          </p15:clr>
+        </p15:guide>
+        <p15:guide id="2" pos="4875" userDrawn="1">
+          <p15:clr>
+            <a:srgbClr val="A4A3A4"/>
+          </p15:clr>
+        </p15:guide>
+      </p15:sldGuideLst>
+    </p:ext>
+  </p:extLst>
 </p:presentation>
 </file>
 
 <file path=ppt/slideLayouts/slideLayout1.xml><?xml version="1.0" encoding="utf-8"?>
-<p:sldLayout xmlns:a="http://schemas.openxmlformats.org/drawingml/2006/main" xmlns:p="http://schemas.openxmlformats.org/presentationml/2006/main" xmlns:r="http://schemas.openxmlformats.org/officeDocument/2006/relationships" xmlns:p14="http://schemas.microsoft.com/office/powerpoint/2010/main" xmlns:p15="http://schemas.microsoft.com/office/powerpoint/2012/main" xmlns:mc="http://schemas.openxmlformats.org/markup-compatibility/2006" type="blank" preserve="1">
+<p:sldLayout xmlns:a="http://schemas.openxmlformats.org/drawingml/2006/main" xmlns:r="http://schemas.openxmlformats.org/officeDocument/2006/relationships" xmlns:p="http://schemas.openxmlformats.org/presentationml/2006/main" type="blank" preserve="1">
   <p:cSld name="Blank Slide">
     <p:spTree>
       <p:nvGrpSpPr>
@@ -32,11 +145,14 @@
       </p:grpSpPr>
     </p:spTree>
   </p:cSld>
+  <p:clrMapOvr>
+    <a:masterClrMapping/>
+  </p:clrMapOvr>
 </p:sldLayout>
 </file>
 
 <file path=ppt/slideLayouts/slideLayout10.xml><?xml version="1.0" encoding="utf-8"?>
-<p:sldLayout xmlns:a="http://schemas.openxmlformats.org/drawingml/2006/main" xmlns:p="http://schemas.openxmlformats.org/presentationml/2006/main" xmlns:r="http://schemas.openxmlformats.org/officeDocument/2006/relationships" xmlns:p14="http://schemas.microsoft.com/office/powerpoint/2010/main" xmlns:p15="http://schemas.microsoft.com/office/powerpoint/2012/main" xmlns:mc="http://schemas.openxmlformats.org/markup-compatibility/2006" type="objOverTx" preserve="1">
+<p:sldLayout xmlns:a="http://schemas.openxmlformats.org/drawingml/2006/main" xmlns:r="http://schemas.openxmlformats.org/officeDocument/2006/relationships" xmlns:p="http://schemas.openxmlformats.org/presentationml/2006/main" type="objOverTx" preserve="1">
   <p:cSld name="Title, Content over Content">
     <p:spTree>
       <p:nvGrpSpPr>
@@ -72,11 +188,12 @@
           </a:prstGeom>
         </p:spPr>
         <p:txBody>
-          <a:bodyPr lIns="0" rIns="0" tIns="0" bIns="0" anchor="ctr">
+          <a:bodyPr lIns="0" tIns="0" rIns="0" bIns="0" anchor="ctr">
             <a:noAutofit/>
           </a:bodyPr>
-          <a:p>
-            <a:endParaRPr b="0" lang="en-US" sz="1150" spc="-1" strike="noStrike">
+          <a:lstStyle/>
+          <a:p>
+            <a:endParaRPr lang="en-US" sz="1150" b="0" strike="noStrike" spc="-1">
               <a:solidFill>
                 <a:srgbClr val="000000"/>
               </a:solidFill>
@@ -105,11 +222,12 @@
           </a:prstGeom>
         </p:spPr>
         <p:txBody>
-          <a:bodyPr lIns="0" rIns="0" tIns="0" bIns="0">
+          <a:bodyPr lIns="0" tIns="0" rIns="0" bIns="0">
             <a:normAutofit/>
           </a:bodyPr>
-          <a:p>
-            <a:endParaRPr b="0" lang="en-US" sz="1790" spc="-1" strike="noStrike">
+          <a:lstStyle/>
+          <a:p>
+            <a:endParaRPr lang="en-US" sz="1790" b="0" strike="noStrike" spc="-1">
               <a:solidFill>
                 <a:srgbClr val="000000"/>
               </a:solidFill>
@@ -138,11 +256,12 @@
           </a:prstGeom>
         </p:spPr>
         <p:txBody>
-          <a:bodyPr lIns="0" rIns="0" tIns="0" bIns="0">
+          <a:bodyPr lIns="0" tIns="0" rIns="0" bIns="0">
             <a:normAutofit/>
           </a:bodyPr>
-          <a:p>
-            <a:endParaRPr b="0" lang="en-US" sz="1790" spc="-1" strike="noStrike">
+          <a:lstStyle/>
+          <a:p>
+            <a:endParaRPr lang="en-US" sz="1790" b="0" strike="noStrike" spc="-1">
               <a:solidFill>
                 <a:srgbClr val="000000"/>
               </a:solidFill>
@@ -153,11 +272,14 @@
       </p:sp>
     </p:spTree>
   </p:cSld>
+  <p:clrMapOvr>
+    <a:masterClrMapping/>
+  </p:clrMapOvr>
 </p:sldLayout>
 </file>
 
 <file path=ppt/slideLayouts/slideLayout11.xml><?xml version="1.0" encoding="utf-8"?>
-<p:sldLayout xmlns:a="http://schemas.openxmlformats.org/drawingml/2006/main" xmlns:p="http://schemas.openxmlformats.org/presentationml/2006/main" xmlns:r="http://schemas.openxmlformats.org/officeDocument/2006/relationships" xmlns:p14="http://schemas.microsoft.com/office/powerpoint/2010/main" xmlns:p15="http://schemas.microsoft.com/office/powerpoint/2012/main" xmlns:mc="http://schemas.openxmlformats.org/markup-compatibility/2006" type="fourObj" preserve="1">
+<p:sldLayout xmlns:a="http://schemas.openxmlformats.org/drawingml/2006/main" xmlns:r="http://schemas.openxmlformats.org/officeDocument/2006/relationships" xmlns:p="http://schemas.openxmlformats.org/presentationml/2006/main" type="fourObj" preserve="1">
   <p:cSld name="Title, 4 Content">
     <p:spTree>
       <p:nvGrpSpPr>
@@ -193,11 +315,12 @@
           </a:prstGeom>
         </p:spPr>
         <p:txBody>
-          <a:bodyPr lIns="0" rIns="0" tIns="0" bIns="0" anchor="ctr">
+          <a:bodyPr lIns="0" tIns="0" rIns="0" bIns="0" anchor="ctr">
             <a:noAutofit/>
           </a:bodyPr>
-          <a:p>
-            <a:endParaRPr b="0" lang="en-US" sz="1150" spc="-1" strike="noStrike">
+          <a:lstStyle/>
+          <a:p>
+            <a:endParaRPr lang="en-US" sz="1150" b="0" strike="noStrike" spc="-1">
               <a:solidFill>
                 <a:srgbClr val="000000"/>
               </a:solidFill>
@@ -226,11 +349,12 @@
           </a:prstGeom>
         </p:spPr>
         <p:txBody>
-          <a:bodyPr lIns="0" rIns="0" tIns="0" bIns="0">
+          <a:bodyPr lIns="0" tIns="0" rIns="0" bIns="0">
             <a:normAutofit/>
           </a:bodyPr>
-          <a:p>
-            <a:endParaRPr b="0" lang="en-US" sz="1790" spc="-1" strike="noStrike">
+          <a:lstStyle/>
+          <a:p>
+            <a:endParaRPr lang="en-US" sz="1790" b="0" strike="noStrike" spc="-1">
               <a:solidFill>
                 <a:srgbClr val="000000"/>
               </a:solidFill>
@@ -259,11 +383,12 @@
           </a:prstGeom>
         </p:spPr>
         <p:txBody>
-          <a:bodyPr lIns="0" rIns="0" tIns="0" bIns="0">
+          <a:bodyPr lIns="0" tIns="0" rIns="0" bIns="0">
             <a:normAutofit/>
           </a:bodyPr>
-          <a:p>
-            <a:endParaRPr b="0" lang="en-US" sz="1790" spc="-1" strike="noStrike">
+          <a:lstStyle/>
+          <a:p>
+            <a:endParaRPr lang="en-US" sz="1790" b="0" strike="noStrike" spc="-1">
               <a:solidFill>
                 <a:srgbClr val="000000"/>
               </a:solidFill>
@@ -292,11 +417,12 @@
           </a:prstGeom>
         </p:spPr>
         <p:txBody>
-          <a:bodyPr lIns="0" rIns="0" tIns="0" bIns="0">
+          <a:bodyPr lIns="0" tIns="0" rIns="0" bIns="0">
             <a:normAutofit/>
           </a:bodyPr>
-          <a:p>
-            <a:endParaRPr b="0" lang="en-US" sz="1790" spc="-1" strike="noStrike">
+          <a:lstStyle/>
+          <a:p>
+            <a:endParaRPr lang="en-US" sz="1790" b="0" strike="noStrike" spc="-1">
               <a:solidFill>
                 <a:srgbClr val="000000"/>
               </a:solidFill>
@@ -325,11 +451,12 @@
           </a:prstGeom>
         </p:spPr>
         <p:txBody>
-          <a:bodyPr lIns="0" rIns="0" tIns="0" bIns="0">
+          <a:bodyPr lIns="0" tIns="0" rIns="0" bIns="0">
             <a:normAutofit/>
           </a:bodyPr>
-          <a:p>
-            <a:endParaRPr b="0" lang="en-US" sz="1790" spc="-1" strike="noStrike">
+          <a:lstStyle/>
+          <a:p>
+            <a:endParaRPr lang="en-US" sz="1790" b="0" strike="noStrike" spc="-1">
               <a:solidFill>
                 <a:srgbClr val="000000"/>
               </a:solidFill>
@@ -340,11 +467,14 @@
       </p:sp>
     </p:spTree>
   </p:cSld>
+  <p:clrMapOvr>
+    <a:masterClrMapping/>
+  </p:clrMapOvr>
 </p:sldLayout>
 </file>
 
 <file path=ppt/slideLayouts/slideLayout12.xml><?xml version="1.0" encoding="utf-8"?>
-<p:sldLayout xmlns:a="http://schemas.openxmlformats.org/drawingml/2006/main" xmlns:p="http://schemas.openxmlformats.org/presentationml/2006/main" xmlns:r="http://schemas.openxmlformats.org/officeDocument/2006/relationships" xmlns:p14="http://schemas.microsoft.com/office/powerpoint/2010/main" xmlns:p15="http://schemas.microsoft.com/office/powerpoint/2012/main" xmlns:mc="http://schemas.openxmlformats.org/markup-compatibility/2006" type="blank" preserve="1">
+<p:sldLayout xmlns:a="http://schemas.openxmlformats.org/drawingml/2006/main" xmlns:r="http://schemas.openxmlformats.org/officeDocument/2006/relationships" xmlns:p="http://schemas.openxmlformats.org/presentationml/2006/main" type="blank" preserve="1">
   <p:cSld name="Title, 6 Content">
     <p:spTree>
       <p:nvGrpSpPr>
@@ -380,11 +510,12 @@
           </a:prstGeom>
         </p:spPr>
         <p:txBody>
-          <a:bodyPr lIns="0" rIns="0" tIns="0" bIns="0" anchor="ctr">
+          <a:bodyPr lIns="0" tIns="0" rIns="0" bIns="0" anchor="ctr">
             <a:noAutofit/>
           </a:bodyPr>
-          <a:p>
-            <a:endParaRPr b="0" lang="en-US" sz="1150" spc="-1" strike="noStrike">
+          <a:lstStyle/>
+          <a:p>
+            <a:endParaRPr lang="en-US" sz="1150" b="0" strike="noStrike" spc="-1">
               <a:solidFill>
                 <a:srgbClr val="000000"/>
               </a:solidFill>
@@ -413,11 +544,12 @@
           </a:prstGeom>
         </p:spPr>
         <p:txBody>
-          <a:bodyPr lIns="0" rIns="0" tIns="0" bIns="0">
+          <a:bodyPr lIns="0" tIns="0" rIns="0" bIns="0">
             <a:normAutofit/>
           </a:bodyPr>
-          <a:p>
-            <a:endParaRPr b="0" lang="en-US" sz="1790" spc="-1" strike="noStrike">
+          <a:lstStyle/>
+          <a:p>
+            <a:endParaRPr lang="en-US" sz="1790" b="0" strike="noStrike" spc="-1">
               <a:solidFill>
                 <a:srgbClr val="000000"/>
               </a:solidFill>
@@ -446,11 +578,12 @@
           </a:prstGeom>
         </p:spPr>
         <p:txBody>
-          <a:bodyPr lIns="0" rIns="0" tIns="0" bIns="0">
+          <a:bodyPr lIns="0" tIns="0" rIns="0" bIns="0">
             <a:normAutofit/>
           </a:bodyPr>
-          <a:p>
-            <a:endParaRPr b="0" lang="en-US" sz="1790" spc="-1" strike="noStrike">
+          <a:lstStyle/>
+          <a:p>
+            <a:endParaRPr lang="en-US" sz="1790" b="0" strike="noStrike" spc="-1">
               <a:solidFill>
                 <a:srgbClr val="000000"/>
               </a:solidFill>
@@ -479,11 +612,12 @@
           </a:prstGeom>
         </p:spPr>
         <p:txBody>
-          <a:bodyPr lIns="0" rIns="0" tIns="0" bIns="0">
+          <a:bodyPr lIns="0" tIns="0" rIns="0" bIns="0">
             <a:normAutofit/>
           </a:bodyPr>
-          <a:p>
-            <a:endParaRPr b="0" lang="en-US" sz="1790" spc="-1" strike="noStrike">
+          <a:lstStyle/>
+          <a:p>
+            <a:endParaRPr lang="en-US" sz="1790" b="0" strike="noStrike" spc="-1">
               <a:solidFill>
                 <a:srgbClr val="000000"/>
               </a:solidFill>
@@ -512,11 +646,12 @@
           </a:prstGeom>
         </p:spPr>
         <p:txBody>
-          <a:bodyPr lIns="0" rIns="0" tIns="0" bIns="0">
+          <a:bodyPr lIns="0" tIns="0" rIns="0" bIns="0">
             <a:normAutofit/>
           </a:bodyPr>
-          <a:p>
-            <a:endParaRPr b="0" lang="en-US" sz="1790" spc="-1" strike="noStrike">
+          <a:lstStyle/>
+          <a:p>
+            <a:endParaRPr lang="en-US" sz="1790" b="0" strike="noStrike" spc="-1">
               <a:solidFill>
                 <a:srgbClr val="000000"/>
               </a:solidFill>
@@ -545,11 +680,12 @@
           </a:prstGeom>
         </p:spPr>
         <p:txBody>
-          <a:bodyPr lIns="0" rIns="0" tIns="0" bIns="0">
+          <a:bodyPr lIns="0" tIns="0" rIns="0" bIns="0">
             <a:normAutofit/>
           </a:bodyPr>
-          <a:p>
-            <a:endParaRPr b="0" lang="en-US" sz="1790" spc="-1" strike="noStrike">
+          <a:lstStyle/>
+          <a:p>
+            <a:endParaRPr lang="en-US" sz="1790" b="0" strike="noStrike" spc="-1">
               <a:solidFill>
                 <a:srgbClr val="000000"/>
               </a:solidFill>
@@ -578,11 +714,12 @@
           </a:prstGeom>
         </p:spPr>
         <p:txBody>
-          <a:bodyPr lIns="0" rIns="0" tIns="0" bIns="0">
+          <a:bodyPr lIns="0" tIns="0" rIns="0" bIns="0">
             <a:normAutofit/>
           </a:bodyPr>
-          <a:p>
-            <a:endParaRPr b="0" lang="en-US" sz="1790" spc="-1" strike="noStrike">
+          <a:lstStyle/>
+          <a:p>
+            <a:endParaRPr lang="en-US" sz="1790" b="0" strike="noStrike" spc="-1">
               <a:solidFill>
                 <a:srgbClr val="000000"/>
               </a:solidFill>
@@ -593,11 +730,14 @@
       </p:sp>
     </p:spTree>
   </p:cSld>
+  <p:clrMapOvr>
+    <a:masterClrMapping/>
+  </p:clrMapOvr>
 </p:sldLayout>
 </file>
 
 <file path=ppt/slideLayouts/slideLayout13.xml><?xml version="1.0" encoding="utf-8"?>
-<p:sldLayout xmlns:a="http://schemas.openxmlformats.org/drawingml/2006/main" xmlns:p="http://schemas.openxmlformats.org/presentationml/2006/main" xmlns:r="http://schemas.openxmlformats.org/officeDocument/2006/relationships" xmlns:p14="http://schemas.microsoft.com/office/powerpoint/2010/main" xmlns:p15="http://schemas.microsoft.com/office/powerpoint/2012/main" xmlns:mc="http://schemas.openxmlformats.org/markup-compatibility/2006" type="blank" preserve="1">
+<p:sldLayout xmlns:a="http://schemas.openxmlformats.org/drawingml/2006/main" xmlns:r="http://schemas.openxmlformats.org/officeDocument/2006/relationships" xmlns:p="http://schemas.openxmlformats.org/presentationml/2006/main" type="blank" preserve="1">
   <p:cSld name="Blank Slide">
     <p:spTree>
       <p:nvGrpSpPr>
@@ -615,11 +755,14 @@
       </p:grpSpPr>
     </p:spTree>
   </p:cSld>
+  <p:clrMapOvr>
+    <a:masterClrMapping/>
+  </p:clrMapOvr>
 </p:sldLayout>
 </file>
 
 <file path=ppt/slideLayouts/slideLayout14.xml><?xml version="1.0" encoding="utf-8"?>
-<p:sldLayout xmlns:a="http://schemas.openxmlformats.org/drawingml/2006/main" xmlns:p="http://schemas.openxmlformats.org/presentationml/2006/main" xmlns:r="http://schemas.openxmlformats.org/officeDocument/2006/relationships" xmlns:p14="http://schemas.microsoft.com/office/powerpoint/2010/main" xmlns:p15="http://schemas.microsoft.com/office/powerpoint/2012/main" xmlns:mc="http://schemas.openxmlformats.org/markup-compatibility/2006" type="tx" preserve="1">
+<p:sldLayout xmlns:a="http://schemas.openxmlformats.org/drawingml/2006/main" xmlns:r="http://schemas.openxmlformats.org/officeDocument/2006/relationships" xmlns:p="http://schemas.openxmlformats.org/presentationml/2006/main" type="tx" preserve="1">
   <p:cSld name="Title Slide">
     <p:spTree>
       <p:nvGrpSpPr>
@@ -655,11 +798,12 @@
           </a:prstGeom>
         </p:spPr>
         <p:txBody>
-          <a:bodyPr lIns="0" rIns="0" tIns="0" bIns="0" anchor="ctr">
+          <a:bodyPr lIns="0" tIns="0" rIns="0" bIns="0" anchor="ctr">
             <a:noAutofit/>
           </a:bodyPr>
-          <a:p>
-            <a:endParaRPr b="0" lang="en-US" sz="1150" spc="-1" strike="noStrike">
+          <a:lstStyle/>
+          <a:p>
+            <a:endParaRPr lang="en-US" sz="1150" b="0" strike="noStrike" spc="-1">
               <a:solidFill>
                 <a:srgbClr val="000000"/>
               </a:solidFill>
@@ -688,12 +832,13 @@
           </a:prstGeom>
         </p:spPr>
         <p:txBody>
-          <a:bodyPr lIns="0" rIns="0" tIns="0" bIns="0" anchor="ctr">
+          <a:bodyPr lIns="0" tIns="0" rIns="0" bIns="0" anchor="ctr">
             <a:noAutofit/>
           </a:bodyPr>
+          <a:lstStyle/>
           <a:p>
             <a:pPr algn="ctr"/>
-            <a:endParaRPr b="0" lang="en-US" sz="3200" spc="-1" strike="noStrike">
+            <a:endParaRPr lang="en-US" sz="3200" b="0" strike="noStrike" spc="-1">
               <a:latin typeface="Arial"/>
             </a:endParaRPr>
           </a:p>
@@ -701,11 +846,14 @@
       </p:sp>
     </p:spTree>
   </p:cSld>
+  <p:clrMapOvr>
+    <a:masterClrMapping/>
+  </p:clrMapOvr>
 </p:sldLayout>
 </file>
 
 <file path=ppt/slideLayouts/slideLayout15.xml><?xml version="1.0" encoding="utf-8"?>
-<p:sldLayout xmlns:a="http://schemas.openxmlformats.org/drawingml/2006/main" xmlns:p="http://schemas.openxmlformats.org/presentationml/2006/main" xmlns:r="http://schemas.openxmlformats.org/officeDocument/2006/relationships" xmlns:p14="http://schemas.microsoft.com/office/powerpoint/2010/main" xmlns:p15="http://schemas.microsoft.com/office/powerpoint/2012/main" xmlns:mc="http://schemas.openxmlformats.org/markup-compatibility/2006" type="obj" preserve="1">
+<p:sldLayout xmlns:a="http://schemas.openxmlformats.org/drawingml/2006/main" xmlns:r="http://schemas.openxmlformats.org/officeDocument/2006/relationships" xmlns:p="http://schemas.openxmlformats.org/presentationml/2006/main" type="obj" preserve="1">
   <p:cSld name="Title, Content">
     <p:spTree>
       <p:nvGrpSpPr>
@@ -741,11 +889,12 @@
           </a:prstGeom>
         </p:spPr>
         <p:txBody>
-          <a:bodyPr lIns="0" rIns="0" tIns="0" bIns="0" anchor="ctr">
+          <a:bodyPr lIns="0" tIns="0" rIns="0" bIns="0" anchor="ctr">
             <a:noAutofit/>
           </a:bodyPr>
-          <a:p>
-            <a:endParaRPr b="0" lang="en-US" sz="1150" spc="-1" strike="noStrike">
+          <a:lstStyle/>
+          <a:p>
+            <a:endParaRPr lang="en-US" sz="1150" b="0" strike="noStrike" spc="-1">
               <a:solidFill>
                 <a:srgbClr val="000000"/>
               </a:solidFill>
@@ -774,11 +923,12 @@
           </a:prstGeom>
         </p:spPr>
         <p:txBody>
-          <a:bodyPr lIns="0" rIns="0" tIns="0" bIns="0">
+          <a:bodyPr lIns="0" tIns="0" rIns="0" bIns="0">
             <a:normAutofit/>
           </a:bodyPr>
-          <a:p>
-            <a:endParaRPr b="0" lang="en-US" sz="1790" spc="-1" strike="noStrike">
+          <a:lstStyle/>
+          <a:p>
+            <a:endParaRPr lang="en-US" sz="1790" b="0" strike="noStrike" spc="-1">
               <a:solidFill>
                 <a:srgbClr val="000000"/>
               </a:solidFill>
@@ -789,11 +939,14 @@
       </p:sp>
     </p:spTree>
   </p:cSld>
+  <p:clrMapOvr>
+    <a:masterClrMapping/>
+  </p:clrMapOvr>
 </p:sldLayout>
 </file>
 
 <file path=ppt/slideLayouts/slideLayout16.xml><?xml version="1.0" encoding="utf-8"?>
-<p:sldLayout xmlns:a="http://schemas.openxmlformats.org/drawingml/2006/main" xmlns:p="http://schemas.openxmlformats.org/presentationml/2006/main" xmlns:r="http://schemas.openxmlformats.org/officeDocument/2006/relationships" xmlns:p14="http://schemas.microsoft.com/office/powerpoint/2010/main" xmlns:p15="http://schemas.microsoft.com/office/powerpoint/2012/main" xmlns:mc="http://schemas.openxmlformats.org/markup-compatibility/2006" type="twoObj" preserve="1">
+<p:sldLayout xmlns:a="http://schemas.openxmlformats.org/drawingml/2006/main" xmlns:r="http://schemas.openxmlformats.org/officeDocument/2006/relationships" xmlns:p="http://schemas.openxmlformats.org/presentationml/2006/main" type="twoObj" preserve="1">
   <p:cSld name="Title, 2 Content">
     <p:spTree>
       <p:nvGrpSpPr>
@@ -829,11 +982,12 @@
           </a:prstGeom>
         </p:spPr>
         <p:txBody>
-          <a:bodyPr lIns="0" rIns="0" tIns="0" bIns="0" anchor="ctr">
+          <a:bodyPr lIns="0" tIns="0" rIns="0" bIns="0" anchor="ctr">
             <a:noAutofit/>
           </a:bodyPr>
-          <a:p>
-            <a:endParaRPr b="0" lang="en-US" sz="1150" spc="-1" strike="noStrike">
+          <a:lstStyle/>
+          <a:p>
+            <a:endParaRPr lang="en-US" sz="1150" b="0" strike="noStrike" spc="-1">
               <a:solidFill>
                 <a:srgbClr val="000000"/>
               </a:solidFill>
@@ -862,11 +1016,12 @@
           </a:prstGeom>
         </p:spPr>
         <p:txBody>
-          <a:bodyPr lIns="0" rIns="0" tIns="0" bIns="0">
+          <a:bodyPr lIns="0" tIns="0" rIns="0" bIns="0">
             <a:normAutofit/>
           </a:bodyPr>
-          <a:p>
-            <a:endParaRPr b="0" lang="en-US" sz="1790" spc="-1" strike="noStrike">
+          <a:lstStyle/>
+          <a:p>
+            <a:endParaRPr lang="en-US" sz="1790" b="0" strike="noStrike" spc="-1">
               <a:solidFill>
                 <a:srgbClr val="000000"/>
               </a:solidFill>
@@ -895,11 +1050,12 @@
           </a:prstGeom>
         </p:spPr>
         <p:txBody>
-          <a:bodyPr lIns="0" rIns="0" tIns="0" bIns="0">
+          <a:bodyPr lIns="0" tIns="0" rIns="0" bIns="0">
             <a:normAutofit/>
           </a:bodyPr>
-          <a:p>
-            <a:endParaRPr b="0" lang="en-US" sz="1790" spc="-1" strike="noStrike">
+          <a:lstStyle/>
+          <a:p>
+            <a:endParaRPr lang="en-US" sz="1790" b="0" strike="noStrike" spc="-1">
               <a:solidFill>
                 <a:srgbClr val="000000"/>
               </a:solidFill>
@@ -910,11 +1066,14 @@
       </p:sp>
     </p:spTree>
   </p:cSld>
+  <p:clrMapOvr>
+    <a:masterClrMapping/>
+  </p:clrMapOvr>
 </p:sldLayout>
 </file>
 
 <file path=ppt/slideLayouts/slideLayout17.xml><?xml version="1.0" encoding="utf-8"?>
-<p:sldLayout xmlns:a="http://schemas.openxmlformats.org/drawingml/2006/main" xmlns:p="http://schemas.openxmlformats.org/presentationml/2006/main" xmlns:r="http://schemas.openxmlformats.org/officeDocument/2006/relationships" xmlns:p14="http://schemas.microsoft.com/office/powerpoint/2010/main" xmlns:p15="http://schemas.microsoft.com/office/powerpoint/2012/main" xmlns:mc="http://schemas.openxmlformats.org/markup-compatibility/2006" type="titleOnly" preserve="1">
+<p:sldLayout xmlns:a="http://schemas.openxmlformats.org/drawingml/2006/main" xmlns:r="http://schemas.openxmlformats.org/officeDocument/2006/relationships" xmlns:p="http://schemas.openxmlformats.org/presentationml/2006/main" type="titleOnly" preserve="1">
   <p:cSld name="Title Only">
     <p:spTree>
       <p:nvGrpSpPr>
@@ -950,11 +1109,12 @@
           </a:prstGeom>
         </p:spPr>
         <p:txBody>
-          <a:bodyPr lIns="0" rIns="0" tIns="0" bIns="0" anchor="ctr">
+          <a:bodyPr lIns="0" tIns="0" rIns="0" bIns="0" anchor="ctr">
             <a:noAutofit/>
           </a:bodyPr>
-          <a:p>
-            <a:endParaRPr b="0" lang="en-US" sz="1150" spc="-1" strike="noStrike">
+          <a:lstStyle/>
+          <a:p>
+            <a:endParaRPr lang="en-US" sz="1150" b="0" strike="noStrike" spc="-1">
               <a:solidFill>
                 <a:srgbClr val="000000"/>
               </a:solidFill>
@@ -965,11 +1125,14 @@
       </p:sp>
     </p:spTree>
   </p:cSld>
+  <p:clrMapOvr>
+    <a:masterClrMapping/>
+  </p:clrMapOvr>
 </p:sldLayout>
 </file>
 
 <file path=ppt/slideLayouts/slideLayout18.xml><?xml version="1.0" encoding="utf-8"?>
-<p:sldLayout xmlns:a="http://schemas.openxmlformats.org/drawingml/2006/main" xmlns:p="http://schemas.openxmlformats.org/presentationml/2006/main" xmlns:r="http://schemas.openxmlformats.org/officeDocument/2006/relationships" xmlns:p14="http://schemas.microsoft.com/office/powerpoint/2010/main" xmlns:p15="http://schemas.microsoft.com/office/powerpoint/2012/main" xmlns:mc="http://schemas.openxmlformats.org/markup-compatibility/2006" type="objOnly" preserve="1">
+<p:sldLayout xmlns:a="http://schemas.openxmlformats.org/drawingml/2006/main" xmlns:r="http://schemas.openxmlformats.org/officeDocument/2006/relationships" xmlns:p="http://schemas.openxmlformats.org/presentationml/2006/main" type="objOnly" preserve="1">
   <p:cSld name="Centered Text">
     <p:spTree>
       <p:nvGrpSpPr>
@@ -1005,12 +1168,13 @@
           </a:prstGeom>
         </p:spPr>
         <p:txBody>
-          <a:bodyPr lIns="0" rIns="0" tIns="0" bIns="0" anchor="ctr">
+          <a:bodyPr lIns="0" tIns="0" rIns="0" bIns="0" anchor="ctr">
             <a:noAutofit/>
           </a:bodyPr>
+          <a:lstStyle/>
           <a:p>
             <a:pPr algn="ctr"/>
-            <a:endParaRPr b="0" lang="en-US" sz="3200" spc="-1" strike="noStrike">
+            <a:endParaRPr lang="en-US" sz="3200" b="0" strike="noStrike" spc="-1">
               <a:latin typeface="Arial"/>
             </a:endParaRPr>
           </a:p>
@@ -1018,11 +1182,14 @@
       </p:sp>
     </p:spTree>
   </p:cSld>
+  <p:clrMapOvr>
+    <a:masterClrMapping/>
+  </p:clrMapOvr>
 </p:sldLayout>
 </file>
 
 <file path=ppt/slideLayouts/slideLayout19.xml><?xml version="1.0" encoding="utf-8"?>
-<p:sldLayout xmlns:a="http://schemas.openxmlformats.org/drawingml/2006/main" xmlns:p="http://schemas.openxmlformats.org/presentationml/2006/main" xmlns:r="http://schemas.openxmlformats.org/officeDocument/2006/relationships" xmlns:p14="http://schemas.microsoft.com/office/powerpoint/2010/main" xmlns:p15="http://schemas.microsoft.com/office/powerpoint/2012/main" xmlns:mc="http://schemas.openxmlformats.org/markup-compatibility/2006" type="twoObjAndObj" preserve="1">
+<p:sldLayout xmlns:a="http://schemas.openxmlformats.org/drawingml/2006/main" xmlns:r="http://schemas.openxmlformats.org/officeDocument/2006/relationships" xmlns:p="http://schemas.openxmlformats.org/presentationml/2006/main" type="twoObjAndObj" preserve="1">
   <p:cSld name="Title, 2 Content and Content">
     <p:spTree>
       <p:nvGrpSpPr>
@@ -1058,11 +1225,12 @@
           </a:prstGeom>
         </p:spPr>
         <p:txBody>
-          <a:bodyPr lIns="0" rIns="0" tIns="0" bIns="0" anchor="ctr">
+          <a:bodyPr lIns="0" tIns="0" rIns="0" bIns="0" anchor="ctr">
             <a:noAutofit/>
           </a:bodyPr>
-          <a:p>
-            <a:endParaRPr b="0" lang="en-US" sz="1150" spc="-1" strike="noStrike">
+          <a:lstStyle/>
+          <a:p>
+            <a:endParaRPr lang="en-US" sz="1150" b="0" strike="noStrike" spc="-1">
               <a:solidFill>
                 <a:srgbClr val="000000"/>
               </a:solidFill>
@@ -1091,11 +1259,12 @@
           </a:prstGeom>
         </p:spPr>
         <p:txBody>
-          <a:bodyPr lIns="0" rIns="0" tIns="0" bIns="0">
+          <a:bodyPr lIns="0" tIns="0" rIns="0" bIns="0">
             <a:normAutofit/>
           </a:bodyPr>
-          <a:p>
-            <a:endParaRPr b="0" lang="en-US" sz="1790" spc="-1" strike="noStrike">
+          <a:lstStyle/>
+          <a:p>
+            <a:endParaRPr lang="en-US" sz="1790" b="0" strike="noStrike" spc="-1">
               <a:solidFill>
                 <a:srgbClr val="000000"/>
               </a:solidFill>
@@ -1124,11 +1293,12 @@
           </a:prstGeom>
         </p:spPr>
         <p:txBody>
-          <a:bodyPr lIns="0" rIns="0" tIns="0" bIns="0">
+          <a:bodyPr lIns="0" tIns="0" rIns="0" bIns="0">
             <a:normAutofit/>
           </a:bodyPr>
-          <a:p>
-            <a:endParaRPr b="0" lang="en-US" sz="1790" spc="-1" strike="noStrike">
+          <a:lstStyle/>
+          <a:p>
+            <a:endParaRPr lang="en-US" sz="1790" b="0" strike="noStrike" spc="-1">
               <a:solidFill>
                 <a:srgbClr val="000000"/>
               </a:solidFill>
@@ -1157,11 +1327,12 @@
           </a:prstGeom>
         </p:spPr>
         <p:txBody>
-          <a:bodyPr lIns="0" rIns="0" tIns="0" bIns="0">
+          <a:bodyPr lIns="0" tIns="0" rIns="0" bIns="0">
             <a:normAutofit/>
           </a:bodyPr>
-          <a:p>
-            <a:endParaRPr b="0" lang="en-US" sz="1790" spc="-1" strike="noStrike">
+          <a:lstStyle/>
+          <a:p>
+            <a:endParaRPr lang="en-US" sz="1790" b="0" strike="noStrike" spc="-1">
               <a:solidFill>
                 <a:srgbClr val="000000"/>
               </a:solidFill>
@@ -1172,11 +1343,14 @@
       </p:sp>
     </p:spTree>
   </p:cSld>
+  <p:clrMapOvr>
+    <a:masterClrMapping/>
+  </p:clrMapOvr>
 </p:sldLayout>
 </file>
 
 <file path=ppt/slideLayouts/slideLayout2.xml><?xml version="1.0" encoding="utf-8"?>
-<p:sldLayout xmlns:a="http://schemas.openxmlformats.org/drawingml/2006/main" xmlns:p="http://schemas.openxmlformats.org/presentationml/2006/main" xmlns:r="http://schemas.openxmlformats.org/officeDocument/2006/relationships" xmlns:p14="http://schemas.microsoft.com/office/powerpoint/2010/main" xmlns:p15="http://schemas.microsoft.com/office/powerpoint/2012/main" xmlns:mc="http://schemas.openxmlformats.org/markup-compatibility/2006" type="tx" preserve="1">
+<p:sldLayout xmlns:a="http://schemas.openxmlformats.org/drawingml/2006/main" xmlns:r="http://schemas.openxmlformats.org/officeDocument/2006/relationships" xmlns:p="http://schemas.openxmlformats.org/presentationml/2006/main" type="tx" preserve="1">
   <p:cSld name="Title Slide">
     <p:spTree>
       <p:nvGrpSpPr>
@@ -1212,11 +1386,12 @@
           </a:prstGeom>
         </p:spPr>
         <p:txBody>
-          <a:bodyPr lIns="0" rIns="0" tIns="0" bIns="0" anchor="ctr">
+          <a:bodyPr lIns="0" tIns="0" rIns="0" bIns="0" anchor="ctr">
             <a:noAutofit/>
           </a:bodyPr>
-          <a:p>
-            <a:endParaRPr b="0" lang="en-US" sz="1150" spc="-1" strike="noStrike">
+          <a:lstStyle/>
+          <a:p>
+            <a:endParaRPr lang="en-US" sz="1150" b="0" strike="noStrike" spc="-1">
               <a:solidFill>
                 <a:srgbClr val="000000"/>
               </a:solidFill>
@@ -1245,12 +1420,13 @@
           </a:prstGeom>
         </p:spPr>
         <p:txBody>
-          <a:bodyPr lIns="0" rIns="0" tIns="0" bIns="0" anchor="ctr">
+          <a:bodyPr lIns="0" tIns="0" rIns="0" bIns="0" anchor="ctr">
             <a:noAutofit/>
           </a:bodyPr>
+          <a:lstStyle/>
           <a:p>
             <a:pPr algn="ctr"/>
-            <a:endParaRPr b="0" lang="en-US" sz="3200" spc="-1" strike="noStrike">
+            <a:endParaRPr lang="en-US" sz="3200" b="0" strike="noStrike" spc="-1">
               <a:latin typeface="Arial"/>
             </a:endParaRPr>
           </a:p>
@@ -1258,11 +1434,14 @@
       </p:sp>
     </p:spTree>
   </p:cSld>
+  <p:clrMapOvr>
+    <a:masterClrMapping/>
+  </p:clrMapOvr>
 </p:sldLayout>
 </file>
 
 <file path=ppt/slideLayouts/slideLayout20.xml><?xml version="1.0" encoding="utf-8"?>
-<p:sldLayout xmlns:a="http://schemas.openxmlformats.org/drawingml/2006/main" xmlns:p="http://schemas.openxmlformats.org/presentationml/2006/main" xmlns:r="http://schemas.openxmlformats.org/officeDocument/2006/relationships" xmlns:p14="http://schemas.microsoft.com/office/powerpoint/2010/main" xmlns:p15="http://schemas.microsoft.com/office/powerpoint/2012/main" xmlns:mc="http://schemas.openxmlformats.org/markup-compatibility/2006" type="objAndTwoObj" preserve="1">
+<p:sldLayout xmlns:a="http://schemas.openxmlformats.org/drawingml/2006/main" xmlns:r="http://schemas.openxmlformats.org/officeDocument/2006/relationships" xmlns:p="http://schemas.openxmlformats.org/presentationml/2006/main" type="objAndTwoObj" preserve="1">
   <p:cSld name="Title Content and 2 Content">
     <p:spTree>
       <p:nvGrpSpPr>
@@ -1298,11 +1477,12 @@
           </a:prstGeom>
         </p:spPr>
         <p:txBody>
-          <a:bodyPr lIns="0" rIns="0" tIns="0" bIns="0" anchor="ctr">
+          <a:bodyPr lIns="0" tIns="0" rIns="0" bIns="0" anchor="ctr">
             <a:noAutofit/>
           </a:bodyPr>
-          <a:p>
-            <a:endParaRPr b="0" lang="en-US" sz="1150" spc="-1" strike="noStrike">
+          <a:lstStyle/>
+          <a:p>
+            <a:endParaRPr lang="en-US" sz="1150" b="0" strike="noStrike" spc="-1">
               <a:solidFill>
                 <a:srgbClr val="000000"/>
               </a:solidFill>
@@ -1331,11 +1511,12 @@
           </a:prstGeom>
         </p:spPr>
         <p:txBody>
-          <a:bodyPr lIns="0" rIns="0" tIns="0" bIns="0">
+          <a:bodyPr lIns="0" tIns="0" rIns="0" bIns="0">
             <a:normAutofit/>
           </a:bodyPr>
-          <a:p>
-            <a:endParaRPr b="0" lang="en-US" sz="1790" spc="-1" strike="noStrike">
+          <a:lstStyle/>
+          <a:p>
+            <a:endParaRPr lang="en-US" sz="1790" b="0" strike="noStrike" spc="-1">
               <a:solidFill>
                 <a:srgbClr val="000000"/>
               </a:solidFill>
@@ -1364,11 +1545,12 @@
           </a:prstGeom>
         </p:spPr>
         <p:txBody>
-          <a:bodyPr lIns="0" rIns="0" tIns="0" bIns="0">
+          <a:bodyPr lIns="0" tIns="0" rIns="0" bIns="0">
             <a:normAutofit/>
           </a:bodyPr>
-          <a:p>
-            <a:endParaRPr b="0" lang="en-US" sz="1790" spc="-1" strike="noStrike">
+          <a:lstStyle/>
+          <a:p>
+            <a:endParaRPr lang="en-US" sz="1790" b="0" strike="noStrike" spc="-1">
               <a:solidFill>
                 <a:srgbClr val="000000"/>
               </a:solidFill>
@@ -1397,11 +1579,12 @@
           </a:prstGeom>
         </p:spPr>
         <p:txBody>
-          <a:bodyPr lIns="0" rIns="0" tIns="0" bIns="0">
+          <a:bodyPr lIns="0" tIns="0" rIns="0" bIns="0">
             <a:normAutofit/>
           </a:bodyPr>
-          <a:p>
-            <a:endParaRPr b="0" lang="en-US" sz="1790" spc="-1" strike="noStrike">
+          <a:lstStyle/>
+          <a:p>
+            <a:endParaRPr lang="en-US" sz="1790" b="0" strike="noStrike" spc="-1">
               <a:solidFill>
                 <a:srgbClr val="000000"/>
               </a:solidFill>
@@ -1412,11 +1595,14 @@
       </p:sp>
     </p:spTree>
   </p:cSld>
+  <p:clrMapOvr>
+    <a:masterClrMapping/>
+  </p:clrMapOvr>
 </p:sldLayout>
 </file>
 
 <file path=ppt/slideLayouts/slideLayout21.xml><?xml version="1.0" encoding="utf-8"?>
-<p:sldLayout xmlns:a="http://schemas.openxmlformats.org/drawingml/2006/main" xmlns:p="http://schemas.openxmlformats.org/presentationml/2006/main" xmlns:r="http://schemas.openxmlformats.org/officeDocument/2006/relationships" xmlns:p14="http://schemas.microsoft.com/office/powerpoint/2010/main" xmlns:p15="http://schemas.microsoft.com/office/powerpoint/2012/main" xmlns:mc="http://schemas.openxmlformats.org/markup-compatibility/2006" type="twoObjOverTx" preserve="1">
+<p:sldLayout xmlns:a="http://schemas.openxmlformats.org/drawingml/2006/main" xmlns:r="http://schemas.openxmlformats.org/officeDocument/2006/relationships" xmlns:p="http://schemas.openxmlformats.org/presentationml/2006/main" type="twoObjOverTx" preserve="1">
   <p:cSld name="Title, 2 Content over Content">
     <p:spTree>
       <p:nvGrpSpPr>
@@ -1452,11 +1638,12 @@
           </a:prstGeom>
         </p:spPr>
         <p:txBody>
-          <a:bodyPr lIns="0" rIns="0" tIns="0" bIns="0" anchor="ctr">
+          <a:bodyPr lIns="0" tIns="0" rIns="0" bIns="0" anchor="ctr">
             <a:noAutofit/>
           </a:bodyPr>
-          <a:p>
-            <a:endParaRPr b="0" lang="en-US" sz="1150" spc="-1" strike="noStrike">
+          <a:lstStyle/>
+          <a:p>
+            <a:endParaRPr lang="en-US" sz="1150" b="0" strike="noStrike" spc="-1">
               <a:solidFill>
                 <a:srgbClr val="000000"/>
               </a:solidFill>
@@ -1485,11 +1672,12 @@
           </a:prstGeom>
         </p:spPr>
         <p:txBody>
-          <a:bodyPr lIns="0" rIns="0" tIns="0" bIns="0">
+          <a:bodyPr lIns="0" tIns="0" rIns="0" bIns="0">
             <a:normAutofit/>
           </a:bodyPr>
-          <a:p>
-            <a:endParaRPr b="0" lang="en-US" sz="1790" spc="-1" strike="noStrike">
+          <a:lstStyle/>
+          <a:p>
+            <a:endParaRPr lang="en-US" sz="1790" b="0" strike="noStrike" spc="-1">
               <a:solidFill>
                 <a:srgbClr val="000000"/>
               </a:solidFill>
@@ -1518,11 +1706,12 @@
           </a:prstGeom>
         </p:spPr>
         <p:txBody>
-          <a:bodyPr lIns="0" rIns="0" tIns="0" bIns="0">
+          <a:bodyPr lIns="0" tIns="0" rIns="0" bIns="0">
             <a:normAutofit/>
           </a:bodyPr>
-          <a:p>
-            <a:endParaRPr b="0" lang="en-US" sz="1790" spc="-1" strike="noStrike">
+          <a:lstStyle/>
+          <a:p>
+            <a:endParaRPr lang="en-US" sz="1790" b="0" strike="noStrike" spc="-1">
               <a:solidFill>
                 <a:srgbClr val="000000"/>
               </a:solidFill>
@@ -1551,11 +1740,12 @@
           </a:prstGeom>
         </p:spPr>
         <p:txBody>
-          <a:bodyPr lIns="0" rIns="0" tIns="0" bIns="0">
+          <a:bodyPr lIns="0" tIns="0" rIns="0" bIns="0">
             <a:normAutofit/>
           </a:bodyPr>
-          <a:p>
-            <a:endParaRPr b="0" lang="en-US" sz="1790" spc="-1" strike="noStrike">
+          <a:lstStyle/>
+          <a:p>
+            <a:endParaRPr lang="en-US" sz="1790" b="0" strike="noStrike" spc="-1">
               <a:solidFill>
                 <a:srgbClr val="000000"/>
               </a:solidFill>
@@ -1566,11 +1756,14 @@
       </p:sp>
     </p:spTree>
   </p:cSld>
+  <p:clrMapOvr>
+    <a:masterClrMapping/>
+  </p:clrMapOvr>
 </p:sldLayout>
 </file>
 
 <file path=ppt/slideLayouts/slideLayout22.xml><?xml version="1.0" encoding="utf-8"?>
-<p:sldLayout xmlns:a="http://schemas.openxmlformats.org/drawingml/2006/main" xmlns:p="http://schemas.openxmlformats.org/presentationml/2006/main" xmlns:r="http://schemas.openxmlformats.org/officeDocument/2006/relationships" xmlns:p14="http://schemas.microsoft.com/office/powerpoint/2010/main" xmlns:p15="http://schemas.microsoft.com/office/powerpoint/2012/main" xmlns:mc="http://schemas.openxmlformats.org/markup-compatibility/2006" type="objOverTx" preserve="1">
+<p:sldLayout xmlns:a="http://schemas.openxmlformats.org/drawingml/2006/main" xmlns:r="http://schemas.openxmlformats.org/officeDocument/2006/relationships" xmlns:p="http://schemas.openxmlformats.org/presentationml/2006/main" type="objOverTx" preserve="1">
   <p:cSld name="Title, Content over Content">
     <p:spTree>
       <p:nvGrpSpPr>
@@ -1606,11 +1799,12 @@
           </a:prstGeom>
         </p:spPr>
         <p:txBody>
-          <a:bodyPr lIns="0" rIns="0" tIns="0" bIns="0" anchor="ctr">
+          <a:bodyPr lIns="0" tIns="0" rIns="0" bIns="0" anchor="ctr">
             <a:noAutofit/>
           </a:bodyPr>
-          <a:p>
-            <a:endParaRPr b="0" lang="en-US" sz="1150" spc="-1" strike="noStrike">
+          <a:lstStyle/>
+          <a:p>
+            <a:endParaRPr lang="en-US" sz="1150" b="0" strike="noStrike" spc="-1">
               <a:solidFill>
                 <a:srgbClr val="000000"/>
               </a:solidFill>
@@ -1639,11 +1833,12 @@
           </a:prstGeom>
         </p:spPr>
         <p:txBody>
-          <a:bodyPr lIns="0" rIns="0" tIns="0" bIns="0">
+          <a:bodyPr lIns="0" tIns="0" rIns="0" bIns="0">
             <a:normAutofit/>
           </a:bodyPr>
-          <a:p>
-            <a:endParaRPr b="0" lang="en-US" sz="1790" spc="-1" strike="noStrike">
+          <a:lstStyle/>
+          <a:p>
+            <a:endParaRPr lang="en-US" sz="1790" b="0" strike="noStrike" spc="-1">
               <a:solidFill>
                 <a:srgbClr val="000000"/>
               </a:solidFill>
@@ -1672,11 +1867,12 @@
           </a:prstGeom>
         </p:spPr>
         <p:txBody>
-          <a:bodyPr lIns="0" rIns="0" tIns="0" bIns="0">
+          <a:bodyPr lIns="0" tIns="0" rIns="0" bIns="0">
             <a:normAutofit/>
           </a:bodyPr>
-          <a:p>
-            <a:endParaRPr b="0" lang="en-US" sz="1790" spc="-1" strike="noStrike">
+          <a:lstStyle/>
+          <a:p>
+            <a:endParaRPr lang="en-US" sz="1790" b="0" strike="noStrike" spc="-1">
               <a:solidFill>
                 <a:srgbClr val="000000"/>
               </a:solidFill>
@@ -1687,11 +1883,14 @@
       </p:sp>
     </p:spTree>
   </p:cSld>
+  <p:clrMapOvr>
+    <a:masterClrMapping/>
+  </p:clrMapOvr>
 </p:sldLayout>
 </file>
 
 <file path=ppt/slideLayouts/slideLayout23.xml><?xml version="1.0" encoding="utf-8"?>
-<p:sldLayout xmlns:a="http://schemas.openxmlformats.org/drawingml/2006/main" xmlns:p="http://schemas.openxmlformats.org/presentationml/2006/main" xmlns:r="http://schemas.openxmlformats.org/officeDocument/2006/relationships" xmlns:p14="http://schemas.microsoft.com/office/powerpoint/2010/main" xmlns:p15="http://schemas.microsoft.com/office/powerpoint/2012/main" xmlns:mc="http://schemas.openxmlformats.org/markup-compatibility/2006" type="fourObj" preserve="1">
+<p:sldLayout xmlns:a="http://schemas.openxmlformats.org/drawingml/2006/main" xmlns:r="http://schemas.openxmlformats.org/officeDocument/2006/relationships" xmlns:p="http://schemas.openxmlformats.org/presentationml/2006/main" type="fourObj" preserve="1">
   <p:cSld name="Title, 4 Content">
     <p:spTree>
       <p:nvGrpSpPr>
@@ -1727,11 +1926,12 @@
           </a:prstGeom>
         </p:spPr>
         <p:txBody>
-          <a:bodyPr lIns="0" rIns="0" tIns="0" bIns="0" anchor="ctr">
+          <a:bodyPr lIns="0" tIns="0" rIns="0" bIns="0" anchor="ctr">
             <a:noAutofit/>
           </a:bodyPr>
-          <a:p>
-            <a:endParaRPr b="0" lang="en-US" sz="1150" spc="-1" strike="noStrike">
+          <a:lstStyle/>
+          <a:p>
+            <a:endParaRPr lang="en-US" sz="1150" b="0" strike="noStrike" spc="-1">
               <a:solidFill>
                 <a:srgbClr val="000000"/>
               </a:solidFill>
@@ -1760,11 +1960,12 @@
           </a:prstGeom>
         </p:spPr>
         <p:txBody>
-          <a:bodyPr lIns="0" rIns="0" tIns="0" bIns="0">
+          <a:bodyPr lIns="0" tIns="0" rIns="0" bIns="0">
             <a:normAutofit/>
           </a:bodyPr>
-          <a:p>
-            <a:endParaRPr b="0" lang="en-US" sz="1790" spc="-1" strike="noStrike">
+          <a:lstStyle/>
+          <a:p>
+            <a:endParaRPr lang="en-US" sz="1790" b="0" strike="noStrike" spc="-1">
               <a:solidFill>
                 <a:srgbClr val="000000"/>
               </a:solidFill>
@@ -1793,11 +1994,12 @@
           </a:prstGeom>
         </p:spPr>
         <p:txBody>
-          <a:bodyPr lIns="0" rIns="0" tIns="0" bIns="0">
+          <a:bodyPr lIns="0" tIns="0" rIns="0" bIns="0">
             <a:normAutofit/>
           </a:bodyPr>
-          <a:p>
-            <a:endParaRPr b="0" lang="en-US" sz="1790" spc="-1" strike="noStrike">
+          <a:lstStyle/>
+          <a:p>
+            <a:endParaRPr lang="en-US" sz="1790" b="0" strike="noStrike" spc="-1">
               <a:solidFill>
                 <a:srgbClr val="000000"/>
               </a:solidFill>
@@ -1826,11 +2028,12 @@
           </a:prstGeom>
         </p:spPr>
         <p:txBody>
-          <a:bodyPr lIns="0" rIns="0" tIns="0" bIns="0">
+          <a:bodyPr lIns="0" tIns="0" rIns="0" bIns="0">
             <a:normAutofit/>
           </a:bodyPr>
-          <a:p>
-            <a:endParaRPr b="0" lang="en-US" sz="1790" spc="-1" strike="noStrike">
+          <a:lstStyle/>
+          <a:p>
+            <a:endParaRPr lang="en-US" sz="1790" b="0" strike="noStrike" spc="-1">
               <a:solidFill>
                 <a:srgbClr val="000000"/>
               </a:solidFill>
@@ -1859,11 +2062,12 @@
           </a:prstGeom>
         </p:spPr>
         <p:txBody>
-          <a:bodyPr lIns="0" rIns="0" tIns="0" bIns="0">
+          <a:bodyPr lIns="0" tIns="0" rIns="0" bIns="0">
             <a:normAutofit/>
           </a:bodyPr>
-          <a:p>
-            <a:endParaRPr b="0" lang="en-US" sz="1790" spc="-1" strike="noStrike">
+          <a:lstStyle/>
+          <a:p>
+            <a:endParaRPr lang="en-US" sz="1790" b="0" strike="noStrike" spc="-1">
               <a:solidFill>
                 <a:srgbClr val="000000"/>
               </a:solidFill>
@@ -1874,11 +2078,14 @@
       </p:sp>
     </p:spTree>
   </p:cSld>
+  <p:clrMapOvr>
+    <a:masterClrMapping/>
+  </p:clrMapOvr>
 </p:sldLayout>
 </file>
 
 <file path=ppt/slideLayouts/slideLayout24.xml><?xml version="1.0" encoding="utf-8"?>
-<p:sldLayout xmlns:a="http://schemas.openxmlformats.org/drawingml/2006/main" xmlns:p="http://schemas.openxmlformats.org/presentationml/2006/main" xmlns:r="http://schemas.openxmlformats.org/officeDocument/2006/relationships" xmlns:p14="http://schemas.microsoft.com/office/powerpoint/2010/main" xmlns:p15="http://schemas.microsoft.com/office/powerpoint/2012/main" xmlns:mc="http://schemas.openxmlformats.org/markup-compatibility/2006" type="blank" preserve="1">
+<p:sldLayout xmlns:a="http://schemas.openxmlformats.org/drawingml/2006/main" xmlns:r="http://schemas.openxmlformats.org/officeDocument/2006/relationships" xmlns:p="http://schemas.openxmlformats.org/presentationml/2006/main" type="blank" preserve="1">
   <p:cSld name="Title, 6 Content">
     <p:spTree>
       <p:nvGrpSpPr>
@@ -1914,11 +2121,12 @@
           </a:prstGeom>
         </p:spPr>
         <p:txBody>
-          <a:bodyPr lIns="0" rIns="0" tIns="0" bIns="0" anchor="ctr">
+          <a:bodyPr lIns="0" tIns="0" rIns="0" bIns="0" anchor="ctr">
             <a:noAutofit/>
           </a:bodyPr>
-          <a:p>
-            <a:endParaRPr b="0" lang="en-US" sz="1150" spc="-1" strike="noStrike">
+          <a:lstStyle/>
+          <a:p>
+            <a:endParaRPr lang="en-US" sz="1150" b="0" strike="noStrike" spc="-1">
               <a:solidFill>
                 <a:srgbClr val="000000"/>
               </a:solidFill>
@@ -1947,11 +2155,12 @@
           </a:prstGeom>
         </p:spPr>
         <p:txBody>
-          <a:bodyPr lIns="0" rIns="0" tIns="0" bIns="0">
+          <a:bodyPr lIns="0" tIns="0" rIns="0" bIns="0">
             <a:normAutofit/>
           </a:bodyPr>
-          <a:p>
-            <a:endParaRPr b="0" lang="en-US" sz="1790" spc="-1" strike="noStrike">
+          <a:lstStyle/>
+          <a:p>
+            <a:endParaRPr lang="en-US" sz="1790" b="0" strike="noStrike" spc="-1">
               <a:solidFill>
                 <a:srgbClr val="000000"/>
               </a:solidFill>
@@ -1980,11 +2189,12 @@
           </a:prstGeom>
         </p:spPr>
         <p:txBody>
-          <a:bodyPr lIns="0" rIns="0" tIns="0" bIns="0">
+          <a:bodyPr lIns="0" tIns="0" rIns="0" bIns="0">
             <a:normAutofit/>
           </a:bodyPr>
-          <a:p>
-            <a:endParaRPr b="0" lang="en-US" sz="1790" spc="-1" strike="noStrike">
+          <a:lstStyle/>
+          <a:p>
+            <a:endParaRPr lang="en-US" sz="1790" b="0" strike="noStrike" spc="-1">
               <a:solidFill>
                 <a:srgbClr val="000000"/>
               </a:solidFill>
@@ -2013,11 +2223,12 @@
           </a:prstGeom>
         </p:spPr>
         <p:txBody>
-          <a:bodyPr lIns="0" rIns="0" tIns="0" bIns="0">
+          <a:bodyPr lIns="0" tIns="0" rIns="0" bIns="0">
             <a:normAutofit/>
           </a:bodyPr>
-          <a:p>
-            <a:endParaRPr b="0" lang="en-US" sz="1790" spc="-1" strike="noStrike">
+          <a:lstStyle/>
+          <a:p>
+            <a:endParaRPr lang="en-US" sz="1790" b="0" strike="noStrike" spc="-1">
               <a:solidFill>
                 <a:srgbClr val="000000"/>
               </a:solidFill>
@@ -2046,11 +2257,12 @@
           </a:prstGeom>
         </p:spPr>
         <p:txBody>
-          <a:bodyPr lIns="0" rIns="0" tIns="0" bIns="0">
+          <a:bodyPr lIns="0" tIns="0" rIns="0" bIns="0">
             <a:normAutofit/>
           </a:bodyPr>
-          <a:p>
-            <a:endParaRPr b="0" lang="en-US" sz="1790" spc="-1" strike="noStrike">
+          <a:lstStyle/>
+          <a:p>
+            <a:endParaRPr lang="en-US" sz="1790" b="0" strike="noStrike" spc="-1">
               <a:solidFill>
                 <a:srgbClr val="000000"/>
               </a:solidFill>
@@ -2079,11 +2291,12 @@
           </a:prstGeom>
         </p:spPr>
         <p:txBody>
-          <a:bodyPr lIns="0" rIns="0" tIns="0" bIns="0">
+          <a:bodyPr lIns="0" tIns="0" rIns="0" bIns="0">
             <a:normAutofit/>
           </a:bodyPr>
-          <a:p>
-            <a:endParaRPr b="0" lang="en-US" sz="1790" spc="-1" strike="noStrike">
+          <a:lstStyle/>
+          <a:p>
+            <a:endParaRPr lang="en-US" sz="1790" b="0" strike="noStrike" spc="-1">
               <a:solidFill>
                 <a:srgbClr val="000000"/>
               </a:solidFill>
@@ -2112,11 +2325,12 @@
           </a:prstGeom>
         </p:spPr>
         <p:txBody>
-          <a:bodyPr lIns="0" rIns="0" tIns="0" bIns="0">
+          <a:bodyPr lIns="0" tIns="0" rIns="0" bIns="0">
             <a:normAutofit/>
           </a:bodyPr>
-          <a:p>
-            <a:endParaRPr b="0" lang="en-US" sz="1790" spc="-1" strike="noStrike">
+          <a:lstStyle/>
+          <a:p>
+            <a:endParaRPr lang="en-US" sz="1790" b="0" strike="noStrike" spc="-1">
               <a:solidFill>
                 <a:srgbClr val="000000"/>
               </a:solidFill>
@@ -2127,11 +2341,14 @@
       </p:sp>
     </p:spTree>
   </p:cSld>
+  <p:clrMapOvr>
+    <a:masterClrMapping/>
+  </p:clrMapOvr>
 </p:sldLayout>
 </file>
 
 <file path=ppt/slideLayouts/slideLayout3.xml><?xml version="1.0" encoding="utf-8"?>
-<p:sldLayout xmlns:a="http://schemas.openxmlformats.org/drawingml/2006/main" xmlns:p="http://schemas.openxmlformats.org/presentationml/2006/main" xmlns:r="http://schemas.openxmlformats.org/officeDocument/2006/relationships" xmlns:p14="http://schemas.microsoft.com/office/powerpoint/2010/main" xmlns:p15="http://schemas.microsoft.com/office/powerpoint/2012/main" xmlns:mc="http://schemas.openxmlformats.org/markup-compatibility/2006" type="obj" preserve="1">
+<p:sldLayout xmlns:a="http://schemas.openxmlformats.org/drawingml/2006/main" xmlns:r="http://schemas.openxmlformats.org/officeDocument/2006/relationships" xmlns:p="http://schemas.openxmlformats.org/presentationml/2006/main" type="obj" preserve="1">
   <p:cSld name="Title, Content">
     <p:spTree>
       <p:nvGrpSpPr>
@@ -2167,11 +2384,12 @@
           </a:prstGeom>
         </p:spPr>
         <p:txBody>
-          <a:bodyPr lIns="0" rIns="0" tIns="0" bIns="0" anchor="ctr">
+          <a:bodyPr lIns="0" tIns="0" rIns="0" bIns="0" anchor="ctr">
             <a:noAutofit/>
           </a:bodyPr>
-          <a:p>
-            <a:endParaRPr b="0" lang="en-US" sz="1150" spc="-1" strike="noStrike">
+          <a:lstStyle/>
+          <a:p>
+            <a:endParaRPr lang="en-US" sz="1150" b="0" strike="noStrike" spc="-1">
               <a:solidFill>
                 <a:srgbClr val="000000"/>
               </a:solidFill>
@@ -2200,11 +2418,12 @@
           </a:prstGeom>
         </p:spPr>
         <p:txBody>
-          <a:bodyPr lIns="0" rIns="0" tIns="0" bIns="0">
+          <a:bodyPr lIns="0" tIns="0" rIns="0" bIns="0">
             <a:normAutofit/>
           </a:bodyPr>
-          <a:p>
-            <a:endParaRPr b="0" lang="en-US" sz="1790" spc="-1" strike="noStrike">
+          <a:lstStyle/>
+          <a:p>
+            <a:endParaRPr lang="en-US" sz="1790" b="0" strike="noStrike" spc="-1">
               <a:solidFill>
                 <a:srgbClr val="000000"/>
               </a:solidFill>
@@ -2215,11 +2434,14 @@
       </p:sp>
     </p:spTree>
   </p:cSld>
+  <p:clrMapOvr>
+    <a:masterClrMapping/>
+  </p:clrMapOvr>
 </p:sldLayout>
 </file>
 
 <file path=ppt/slideLayouts/slideLayout4.xml><?xml version="1.0" encoding="utf-8"?>
-<p:sldLayout xmlns:a="http://schemas.openxmlformats.org/drawingml/2006/main" xmlns:p="http://schemas.openxmlformats.org/presentationml/2006/main" xmlns:r="http://schemas.openxmlformats.org/officeDocument/2006/relationships" xmlns:p14="http://schemas.microsoft.com/office/powerpoint/2010/main" xmlns:p15="http://schemas.microsoft.com/office/powerpoint/2012/main" xmlns:mc="http://schemas.openxmlformats.org/markup-compatibility/2006" type="twoObj" preserve="1">
+<p:sldLayout xmlns:a="http://schemas.openxmlformats.org/drawingml/2006/main" xmlns:r="http://schemas.openxmlformats.org/officeDocument/2006/relationships" xmlns:p="http://schemas.openxmlformats.org/presentationml/2006/main" type="twoObj" preserve="1">
   <p:cSld name="Title, 2 Content">
     <p:spTree>
       <p:nvGrpSpPr>
@@ -2255,11 +2477,12 @@
           </a:prstGeom>
         </p:spPr>
         <p:txBody>
-          <a:bodyPr lIns="0" rIns="0" tIns="0" bIns="0" anchor="ctr">
+          <a:bodyPr lIns="0" tIns="0" rIns="0" bIns="0" anchor="ctr">
             <a:noAutofit/>
           </a:bodyPr>
-          <a:p>
-            <a:endParaRPr b="0" lang="en-US" sz="1150" spc="-1" strike="noStrike">
+          <a:lstStyle/>
+          <a:p>
+            <a:endParaRPr lang="en-US" sz="1150" b="0" strike="noStrike" spc="-1">
               <a:solidFill>
                 <a:srgbClr val="000000"/>
               </a:solidFill>
@@ -2288,11 +2511,12 @@
           </a:prstGeom>
         </p:spPr>
         <p:txBody>
-          <a:bodyPr lIns="0" rIns="0" tIns="0" bIns="0">
+          <a:bodyPr lIns="0" tIns="0" rIns="0" bIns="0">
             <a:normAutofit/>
           </a:bodyPr>
-          <a:p>
-            <a:endParaRPr b="0" lang="en-US" sz="1790" spc="-1" strike="noStrike">
+          <a:lstStyle/>
+          <a:p>
+            <a:endParaRPr lang="en-US" sz="1790" b="0" strike="noStrike" spc="-1">
               <a:solidFill>
                 <a:srgbClr val="000000"/>
               </a:solidFill>
@@ -2321,11 +2545,12 @@
           </a:prstGeom>
         </p:spPr>
         <p:txBody>
-          <a:bodyPr lIns="0" rIns="0" tIns="0" bIns="0">
+          <a:bodyPr lIns="0" tIns="0" rIns="0" bIns="0">
             <a:normAutofit/>
           </a:bodyPr>
-          <a:p>
-            <a:endParaRPr b="0" lang="en-US" sz="1790" spc="-1" strike="noStrike">
+          <a:lstStyle/>
+          <a:p>
+            <a:endParaRPr lang="en-US" sz="1790" b="0" strike="noStrike" spc="-1">
               <a:solidFill>
                 <a:srgbClr val="000000"/>
               </a:solidFill>
@@ -2336,11 +2561,14 @@
       </p:sp>
     </p:spTree>
   </p:cSld>
+  <p:clrMapOvr>
+    <a:masterClrMapping/>
+  </p:clrMapOvr>
 </p:sldLayout>
 </file>
 
 <file path=ppt/slideLayouts/slideLayout5.xml><?xml version="1.0" encoding="utf-8"?>
-<p:sldLayout xmlns:a="http://schemas.openxmlformats.org/drawingml/2006/main" xmlns:p="http://schemas.openxmlformats.org/presentationml/2006/main" xmlns:r="http://schemas.openxmlformats.org/officeDocument/2006/relationships" xmlns:p14="http://schemas.microsoft.com/office/powerpoint/2010/main" xmlns:p15="http://schemas.microsoft.com/office/powerpoint/2012/main" xmlns:mc="http://schemas.openxmlformats.org/markup-compatibility/2006" type="titleOnly" preserve="1">
+<p:sldLayout xmlns:a="http://schemas.openxmlformats.org/drawingml/2006/main" xmlns:r="http://schemas.openxmlformats.org/officeDocument/2006/relationships" xmlns:p="http://schemas.openxmlformats.org/presentationml/2006/main" type="titleOnly" preserve="1">
   <p:cSld name="Title Only">
     <p:spTree>
       <p:nvGrpSpPr>
@@ -2376,11 +2604,12 @@
           </a:prstGeom>
         </p:spPr>
         <p:txBody>
-          <a:bodyPr lIns="0" rIns="0" tIns="0" bIns="0" anchor="ctr">
+          <a:bodyPr lIns="0" tIns="0" rIns="0" bIns="0" anchor="ctr">
             <a:noAutofit/>
           </a:bodyPr>
-          <a:p>
-            <a:endParaRPr b="0" lang="en-US" sz="1150" spc="-1" strike="noStrike">
+          <a:lstStyle/>
+          <a:p>
+            <a:endParaRPr lang="en-US" sz="1150" b="0" strike="noStrike" spc="-1">
               <a:solidFill>
                 <a:srgbClr val="000000"/>
               </a:solidFill>
@@ -2391,11 +2620,14 @@
       </p:sp>
     </p:spTree>
   </p:cSld>
+  <p:clrMapOvr>
+    <a:masterClrMapping/>
+  </p:clrMapOvr>
 </p:sldLayout>
 </file>
 
 <file path=ppt/slideLayouts/slideLayout6.xml><?xml version="1.0" encoding="utf-8"?>
-<p:sldLayout xmlns:a="http://schemas.openxmlformats.org/drawingml/2006/main" xmlns:p="http://schemas.openxmlformats.org/presentationml/2006/main" xmlns:r="http://schemas.openxmlformats.org/officeDocument/2006/relationships" xmlns:p14="http://schemas.microsoft.com/office/powerpoint/2010/main" xmlns:p15="http://schemas.microsoft.com/office/powerpoint/2012/main" xmlns:mc="http://schemas.openxmlformats.org/markup-compatibility/2006" type="objOnly" preserve="1">
+<p:sldLayout xmlns:a="http://schemas.openxmlformats.org/drawingml/2006/main" xmlns:r="http://schemas.openxmlformats.org/officeDocument/2006/relationships" xmlns:p="http://schemas.openxmlformats.org/presentationml/2006/main" type="objOnly" preserve="1">
   <p:cSld name="Centered Text">
     <p:spTree>
       <p:nvGrpSpPr>
@@ -2431,12 +2663,13 @@
           </a:prstGeom>
         </p:spPr>
         <p:txBody>
-          <a:bodyPr lIns="0" rIns="0" tIns="0" bIns="0" anchor="ctr">
+          <a:bodyPr lIns="0" tIns="0" rIns="0" bIns="0" anchor="ctr">
             <a:noAutofit/>
           </a:bodyPr>
+          <a:lstStyle/>
           <a:p>
             <a:pPr algn="ctr"/>
-            <a:endParaRPr b="0" lang="en-US" sz="3200" spc="-1" strike="noStrike">
+            <a:endParaRPr lang="en-US" sz="3200" b="0" strike="noStrike" spc="-1">
               <a:latin typeface="Arial"/>
             </a:endParaRPr>
           </a:p>
@@ -2444,11 +2677,14 @@
       </p:sp>
     </p:spTree>
   </p:cSld>
+  <p:clrMapOvr>
+    <a:masterClrMapping/>
+  </p:clrMapOvr>
 </p:sldLayout>
 </file>
 
 <file path=ppt/slideLayouts/slideLayout7.xml><?xml version="1.0" encoding="utf-8"?>
-<p:sldLayout xmlns:a="http://schemas.openxmlformats.org/drawingml/2006/main" xmlns:p="http://schemas.openxmlformats.org/presentationml/2006/main" xmlns:r="http://schemas.openxmlformats.org/officeDocument/2006/relationships" xmlns:p14="http://schemas.microsoft.com/office/powerpoint/2010/main" xmlns:p15="http://schemas.microsoft.com/office/powerpoint/2012/main" xmlns:mc="http://schemas.openxmlformats.org/markup-compatibility/2006" type="twoObjAndObj" preserve="1">
+<p:sldLayout xmlns:a="http://schemas.openxmlformats.org/drawingml/2006/main" xmlns:r="http://schemas.openxmlformats.org/officeDocument/2006/relationships" xmlns:p="http://schemas.openxmlformats.org/presentationml/2006/main" type="twoObjAndObj" preserve="1">
   <p:cSld name="Title, 2 Content and Content">
     <p:spTree>
       <p:nvGrpSpPr>
@@ -2484,11 +2720,12 @@
           </a:prstGeom>
         </p:spPr>
         <p:txBody>
-          <a:bodyPr lIns="0" rIns="0" tIns="0" bIns="0" anchor="ctr">
+          <a:bodyPr lIns="0" tIns="0" rIns="0" bIns="0" anchor="ctr">
             <a:noAutofit/>
           </a:bodyPr>
-          <a:p>
-            <a:endParaRPr b="0" lang="en-US" sz="1150" spc="-1" strike="noStrike">
+          <a:lstStyle/>
+          <a:p>
+            <a:endParaRPr lang="en-US" sz="1150" b="0" strike="noStrike" spc="-1">
               <a:solidFill>
                 <a:srgbClr val="000000"/>
               </a:solidFill>
@@ -2517,11 +2754,12 @@
           </a:prstGeom>
         </p:spPr>
         <p:txBody>
-          <a:bodyPr lIns="0" rIns="0" tIns="0" bIns="0">
+          <a:bodyPr lIns="0" tIns="0" rIns="0" bIns="0">
             <a:normAutofit/>
           </a:bodyPr>
-          <a:p>
-            <a:endParaRPr b="0" lang="en-US" sz="1790" spc="-1" strike="noStrike">
+          <a:lstStyle/>
+          <a:p>
+            <a:endParaRPr lang="en-US" sz="1790" b="0" strike="noStrike" spc="-1">
               <a:solidFill>
                 <a:srgbClr val="000000"/>
               </a:solidFill>
@@ -2550,11 +2788,12 @@
           </a:prstGeom>
         </p:spPr>
         <p:txBody>
-          <a:bodyPr lIns="0" rIns="0" tIns="0" bIns="0">
+          <a:bodyPr lIns="0" tIns="0" rIns="0" bIns="0">
             <a:normAutofit/>
           </a:bodyPr>
-          <a:p>
-            <a:endParaRPr b="0" lang="en-US" sz="1790" spc="-1" strike="noStrike">
+          <a:lstStyle/>
+          <a:p>
+            <a:endParaRPr lang="en-US" sz="1790" b="0" strike="noStrike" spc="-1">
               <a:solidFill>
                 <a:srgbClr val="000000"/>
               </a:solidFill>
@@ -2583,11 +2822,12 @@
           </a:prstGeom>
         </p:spPr>
         <p:txBody>
-          <a:bodyPr lIns="0" rIns="0" tIns="0" bIns="0">
+          <a:bodyPr lIns="0" tIns="0" rIns="0" bIns="0">
             <a:normAutofit/>
           </a:bodyPr>
-          <a:p>
-            <a:endParaRPr b="0" lang="en-US" sz="1790" spc="-1" strike="noStrike">
+          <a:lstStyle/>
+          <a:p>
+            <a:endParaRPr lang="en-US" sz="1790" b="0" strike="noStrike" spc="-1">
               <a:solidFill>
                 <a:srgbClr val="000000"/>
               </a:solidFill>
@@ -2598,11 +2838,14 @@
       </p:sp>
     </p:spTree>
   </p:cSld>
+  <p:clrMapOvr>
+    <a:masterClrMapping/>
+  </p:clrMapOvr>
 </p:sldLayout>
 </file>
 
 <file path=ppt/slideLayouts/slideLayout8.xml><?xml version="1.0" encoding="utf-8"?>
-<p:sldLayout xmlns:a="http://schemas.openxmlformats.org/drawingml/2006/main" xmlns:p="http://schemas.openxmlformats.org/presentationml/2006/main" xmlns:r="http://schemas.openxmlformats.org/officeDocument/2006/relationships" xmlns:p14="http://schemas.microsoft.com/office/powerpoint/2010/main" xmlns:p15="http://schemas.microsoft.com/office/powerpoint/2012/main" xmlns:mc="http://schemas.openxmlformats.org/markup-compatibility/2006" type="objAndTwoObj" preserve="1">
+<p:sldLayout xmlns:a="http://schemas.openxmlformats.org/drawingml/2006/main" xmlns:r="http://schemas.openxmlformats.org/officeDocument/2006/relationships" xmlns:p="http://schemas.openxmlformats.org/presentationml/2006/main" type="objAndTwoObj" preserve="1">
   <p:cSld name="Title Content and 2 Content">
     <p:spTree>
       <p:nvGrpSpPr>
@@ -2638,11 +2881,12 @@
           </a:prstGeom>
         </p:spPr>
         <p:txBody>
-          <a:bodyPr lIns="0" rIns="0" tIns="0" bIns="0" anchor="ctr">
+          <a:bodyPr lIns="0" tIns="0" rIns="0" bIns="0" anchor="ctr">
             <a:noAutofit/>
           </a:bodyPr>
-          <a:p>
-            <a:endParaRPr b="0" lang="en-US" sz="1150" spc="-1" strike="noStrike">
+          <a:lstStyle/>
+          <a:p>
+            <a:endParaRPr lang="en-US" sz="1150" b="0" strike="noStrike" spc="-1">
               <a:solidFill>
                 <a:srgbClr val="000000"/>
               </a:solidFill>
@@ -2671,11 +2915,12 @@
           </a:prstGeom>
         </p:spPr>
         <p:txBody>
-          <a:bodyPr lIns="0" rIns="0" tIns="0" bIns="0">
+          <a:bodyPr lIns="0" tIns="0" rIns="0" bIns="0">
             <a:normAutofit/>
           </a:bodyPr>
-          <a:p>
-            <a:endParaRPr b="0" lang="en-US" sz="1790" spc="-1" strike="noStrike">
+          <a:lstStyle/>
+          <a:p>
+            <a:endParaRPr lang="en-US" sz="1790" b="0" strike="noStrike" spc="-1">
               <a:solidFill>
                 <a:srgbClr val="000000"/>
               </a:solidFill>
@@ -2704,11 +2949,12 @@
           </a:prstGeom>
         </p:spPr>
         <p:txBody>
-          <a:bodyPr lIns="0" rIns="0" tIns="0" bIns="0">
+          <a:bodyPr lIns="0" tIns="0" rIns="0" bIns="0">
             <a:normAutofit/>
           </a:bodyPr>
-          <a:p>
-            <a:endParaRPr b="0" lang="en-US" sz="1790" spc="-1" strike="noStrike">
+          <a:lstStyle/>
+          <a:p>
+            <a:endParaRPr lang="en-US" sz="1790" b="0" strike="noStrike" spc="-1">
               <a:solidFill>
                 <a:srgbClr val="000000"/>
               </a:solidFill>
@@ -2737,11 +2983,12 @@
           </a:prstGeom>
         </p:spPr>
         <p:txBody>
-          <a:bodyPr lIns="0" rIns="0" tIns="0" bIns="0">
+          <a:bodyPr lIns="0" tIns="0" rIns="0" bIns="0">
             <a:normAutofit/>
           </a:bodyPr>
-          <a:p>
-            <a:endParaRPr b="0" lang="en-US" sz="1790" spc="-1" strike="noStrike">
+          <a:lstStyle/>
+          <a:p>
+            <a:endParaRPr lang="en-US" sz="1790" b="0" strike="noStrike" spc="-1">
               <a:solidFill>
                 <a:srgbClr val="000000"/>
               </a:solidFill>
@@ -2752,11 +2999,14 @@
       </p:sp>
     </p:spTree>
   </p:cSld>
+  <p:clrMapOvr>
+    <a:masterClrMapping/>
+  </p:clrMapOvr>
 </p:sldLayout>
 </file>
 
 <file path=ppt/slideLayouts/slideLayout9.xml><?xml version="1.0" encoding="utf-8"?>
-<p:sldLayout xmlns:a="http://schemas.openxmlformats.org/drawingml/2006/main" xmlns:p="http://schemas.openxmlformats.org/presentationml/2006/main" xmlns:r="http://schemas.openxmlformats.org/officeDocument/2006/relationships" xmlns:p14="http://schemas.microsoft.com/office/powerpoint/2010/main" xmlns:p15="http://schemas.microsoft.com/office/powerpoint/2012/main" xmlns:mc="http://schemas.openxmlformats.org/markup-compatibility/2006" type="twoObjOverTx" preserve="1">
+<p:sldLayout xmlns:a="http://schemas.openxmlformats.org/drawingml/2006/main" xmlns:r="http://schemas.openxmlformats.org/officeDocument/2006/relationships" xmlns:p="http://schemas.openxmlformats.org/presentationml/2006/main" type="twoObjOverTx" preserve="1">
   <p:cSld name="Title, 2 Content over Content">
     <p:spTree>
       <p:nvGrpSpPr>
@@ -2792,11 +3042,12 @@
           </a:prstGeom>
         </p:spPr>
         <p:txBody>
-          <a:bodyPr lIns="0" rIns="0" tIns="0" bIns="0" anchor="ctr">
+          <a:bodyPr lIns="0" tIns="0" rIns="0" bIns="0" anchor="ctr">
             <a:noAutofit/>
           </a:bodyPr>
-          <a:p>
-            <a:endParaRPr b="0" lang="en-US" sz="1150" spc="-1" strike="noStrike">
+          <a:lstStyle/>
+          <a:p>
+            <a:endParaRPr lang="en-US" sz="1150" b="0" strike="noStrike" spc="-1">
               <a:solidFill>
                 <a:srgbClr val="000000"/>
               </a:solidFill>
@@ -2825,11 +3076,12 @@
           </a:prstGeom>
         </p:spPr>
         <p:txBody>
-          <a:bodyPr lIns="0" rIns="0" tIns="0" bIns="0">
+          <a:bodyPr lIns="0" tIns="0" rIns="0" bIns="0">
             <a:normAutofit/>
           </a:bodyPr>
-          <a:p>
-            <a:endParaRPr b="0" lang="en-US" sz="1790" spc="-1" strike="noStrike">
+          <a:lstStyle/>
+          <a:p>
+            <a:endParaRPr lang="en-US" sz="1790" b="0" strike="noStrike" spc="-1">
               <a:solidFill>
                 <a:srgbClr val="000000"/>
               </a:solidFill>
@@ -2858,11 +3110,12 @@
           </a:prstGeom>
         </p:spPr>
         <p:txBody>
-          <a:bodyPr lIns="0" rIns="0" tIns="0" bIns="0">
+          <a:bodyPr lIns="0" tIns="0" rIns="0" bIns="0">
             <a:normAutofit/>
           </a:bodyPr>
-          <a:p>
-            <a:endParaRPr b="0" lang="en-US" sz="1790" spc="-1" strike="noStrike">
+          <a:lstStyle/>
+          <a:p>
+            <a:endParaRPr lang="en-US" sz="1790" b="0" strike="noStrike" spc="-1">
               <a:solidFill>
                 <a:srgbClr val="000000"/>
               </a:solidFill>
@@ -2891,11 +3144,12 @@
           </a:prstGeom>
         </p:spPr>
         <p:txBody>
-          <a:bodyPr lIns="0" rIns="0" tIns="0" bIns="0">
+          <a:bodyPr lIns="0" tIns="0" rIns="0" bIns="0">
             <a:normAutofit/>
           </a:bodyPr>
-          <a:p>
-            <a:endParaRPr b="0" lang="en-US" sz="1790" spc="-1" strike="noStrike">
+          <a:lstStyle/>
+          <a:p>
+            <a:endParaRPr lang="en-US" sz="1790" b="0" strike="noStrike" spc="-1">
               <a:solidFill>
                 <a:srgbClr val="000000"/>
               </a:solidFill>
@@ -2906,17 +3160,21 @@
       </p:sp>
     </p:spTree>
   </p:cSld>
+  <p:clrMapOvr>
+    <a:masterClrMapping/>
+  </p:clrMapOvr>
 </p:sldLayout>
 </file>
 
 <file path=ppt/slideMasters/slideMaster1.xml><?xml version="1.0" encoding="utf-8"?>
-<p:sldMaster xmlns:a="http://schemas.openxmlformats.org/drawingml/2006/main" xmlns:p="http://schemas.openxmlformats.org/presentationml/2006/main" xmlns:r="http://schemas.openxmlformats.org/officeDocument/2006/relationships" xmlns:p14="http://schemas.microsoft.com/office/powerpoint/2010/main" xmlns:p15="http://schemas.microsoft.com/office/powerpoint/2012/main" xmlns:mc="http://schemas.openxmlformats.org/markup-compatibility/2006">
+<p:sldMaster xmlns:a="http://schemas.openxmlformats.org/drawingml/2006/main" xmlns:r="http://schemas.openxmlformats.org/officeDocument/2006/relationships" xmlns:p="http://schemas.openxmlformats.org/presentationml/2006/main">
   <p:cSld>
     <p:bg>
       <p:bgPr>
         <a:solidFill>
-          <a:srgbClr val="ffffff"/>
+          <a:srgbClr val="FFFFFF"/>
         </a:solidFill>
+        <a:effectLst/>
       </p:bgPr>
     </p:bg>
     <p:spTree>
@@ -2935,7 +3193,7 @@
       </p:grpSpPr>
       <p:sp>
         <p:nvSpPr>
-          <p:cNvPr id="0" name="PlaceHolder 1"/>
+          <p:cNvPr id="5" name="PlaceHolder 1"/>
           <p:cNvSpPr>
             <a:spLocks noGrp="1"/>
           </p:cNvSpPr>
@@ -2956,6 +3214,7 @@
           <a:bodyPr anchor="ctr">
             <a:noAutofit/>
           </a:bodyPr>
+          <a:lstStyle/>
           <a:p>
             <a:pPr>
               <a:lnSpc>
@@ -2963,7 +3222,7 @@
               </a:lnSpc>
             </a:pPr>
             <a:r>
-              <a:rPr b="0" lang="en-US" sz="2810" spc="-1" strike="noStrike">
+              <a:rPr lang="en-US" sz="2810" b="0" strike="noStrike" spc="-1">
                 <a:solidFill>
                   <a:srgbClr val="000000"/>
                 </a:solidFill>
@@ -2971,18 +3230,18 @@
               </a:rPr>
               <a:t>Click to edit Master title style</a:t>
             </a:r>
-            <a:endParaRPr b="0" lang="en-US" sz="2810" spc="-1" strike="noStrike">
-              <a:solidFill>
-                <a:srgbClr val="000000"/>
-              </a:solidFill>
-              <a:latin typeface="Calibri"/>
-            </a:endParaRPr>
-          </a:p>
-        </p:txBody>
-      </p:sp>
-      <p:sp>
-        <p:nvSpPr>
-          <p:cNvPr id="1" name="PlaceHolder 2"/>
+            <a:endParaRPr lang="en-US" sz="2810" b="0" strike="noStrike" spc="-1">
+              <a:solidFill>
+                <a:srgbClr val="000000"/>
+              </a:solidFill>
+              <a:latin typeface="Calibri"/>
+            </a:endParaRPr>
+          </a:p>
+        </p:txBody>
+      </p:sp>
+      <p:sp>
+        <p:nvSpPr>
+          <p:cNvPr id="6" name="PlaceHolder 2"/>
           <p:cNvSpPr>
             <a:spLocks noGrp="1"/>
           </p:cNvSpPr>
@@ -3003,6 +3262,7 @@
           <a:bodyPr>
             <a:noAutofit/>
           </a:bodyPr>
+          <a:lstStyle/>
           <a:p>
             <a:pPr marL="145800" indent="-145440">
               <a:lnSpc>
@@ -3018,7 +3278,7 @@
               <a:buChar char="•"/>
             </a:pPr>
             <a:r>
-              <a:rPr b="0" lang="en-US" sz="1790" spc="-1" strike="noStrike">
+              <a:rPr lang="en-US" sz="1790" b="0" strike="noStrike" spc="-1">
                 <a:solidFill>
                   <a:srgbClr val="000000"/>
                 </a:solidFill>
@@ -3026,15 +3286,9 @@
               </a:rPr>
               <a:t>Click to edit Master text styles</a:t>
             </a:r>
-            <a:endParaRPr b="0" lang="en-US" sz="1790" spc="-1" strike="noStrike">
-              <a:solidFill>
-                <a:srgbClr val="000000"/>
-              </a:solidFill>
-              <a:latin typeface="Calibri"/>
-            </a:endParaRPr>
-          </a:p>
-          <a:p>
-            <a:pPr lvl="1" marL="437040" indent="-145440">
+          </a:p>
+          <a:p>
+            <a:pPr marL="437040" lvl="1" indent="-145440">
               <a:lnSpc>
                 <a:spcPct val="90000"/>
               </a:lnSpc>
@@ -3048,7 +3302,7 @@
               <a:buChar char="•"/>
             </a:pPr>
             <a:r>
-              <a:rPr b="0" lang="en-US" sz="1530" spc="-1" strike="noStrike">
+              <a:rPr lang="en-US" sz="1530" b="0" strike="noStrike" spc="-1">
                 <a:solidFill>
                   <a:srgbClr val="000000"/>
                 </a:solidFill>
@@ -3056,15 +3310,9 @@
               </a:rPr>
               <a:t>Second level</a:t>
             </a:r>
-            <a:endParaRPr b="0" lang="en-US" sz="1530" spc="-1" strike="noStrike">
-              <a:solidFill>
-                <a:srgbClr val="000000"/>
-              </a:solidFill>
-              <a:latin typeface="Calibri"/>
-            </a:endParaRPr>
-          </a:p>
-          <a:p>
-            <a:pPr lvl="2" marL="728640" indent="-145440">
+          </a:p>
+          <a:p>
+            <a:pPr marL="728640" lvl="2" indent="-145440">
               <a:lnSpc>
                 <a:spcPct val="90000"/>
               </a:lnSpc>
@@ -3078,7 +3326,7 @@
               <a:buChar char="•"/>
             </a:pPr>
             <a:r>
-              <a:rPr b="0" lang="en-US" sz="1280" spc="-1" strike="noStrike">
+              <a:rPr lang="en-US" sz="1280" b="0" strike="noStrike" spc="-1">
                 <a:solidFill>
                   <a:srgbClr val="000000"/>
                 </a:solidFill>
@@ -3086,15 +3334,9 @@
               </a:rPr>
               <a:t>Third level</a:t>
             </a:r>
-            <a:endParaRPr b="0" lang="en-US" sz="1280" spc="-1" strike="noStrike">
-              <a:solidFill>
-                <a:srgbClr val="000000"/>
-              </a:solidFill>
-              <a:latin typeface="Calibri"/>
-            </a:endParaRPr>
-          </a:p>
-          <a:p>
-            <a:pPr lvl="3" marL="1020240" indent="-145440">
+          </a:p>
+          <a:p>
+            <a:pPr marL="1020240" lvl="3" indent="-145440">
               <a:lnSpc>
                 <a:spcPct val="90000"/>
               </a:lnSpc>
@@ -3108,7 +3350,7 @@
               <a:buChar char="•"/>
             </a:pPr>
             <a:r>
-              <a:rPr b="0" lang="en-US" sz="1150" spc="-1" strike="noStrike">
+              <a:rPr lang="en-US" sz="1150" b="0" strike="noStrike" spc="-1">
                 <a:solidFill>
                   <a:srgbClr val="000000"/>
                 </a:solidFill>
@@ -3116,15 +3358,9 @@
               </a:rPr>
               <a:t>Fourth level</a:t>
             </a:r>
-            <a:endParaRPr b="0" lang="en-US" sz="1150" spc="-1" strike="noStrike">
-              <a:solidFill>
-                <a:srgbClr val="000000"/>
-              </a:solidFill>
-              <a:latin typeface="Calibri"/>
-            </a:endParaRPr>
-          </a:p>
-          <a:p>
-            <a:pPr lvl="4" marL="1311480" indent="-145440">
+          </a:p>
+          <a:p>
+            <a:pPr marL="1311480" lvl="4" indent="-145440">
               <a:lnSpc>
                 <a:spcPct val="90000"/>
               </a:lnSpc>
@@ -3138,7 +3374,7 @@
               <a:buChar char="•"/>
             </a:pPr>
             <a:r>
-              <a:rPr b="0" lang="en-US" sz="1150" spc="-1" strike="noStrike">
+              <a:rPr lang="en-US" sz="1150" b="0" strike="noStrike" spc="-1">
                 <a:solidFill>
                   <a:srgbClr val="000000"/>
                 </a:solidFill>
@@ -3146,12 +3382,6 @@
               </a:rPr>
               <a:t>Fifth level</a:t>
             </a:r>
-            <a:endParaRPr b="0" lang="en-US" sz="1150" spc="-1" strike="noStrike">
-              <a:solidFill>
-                <a:srgbClr val="000000"/>
-              </a:solidFill>
-              <a:latin typeface="Calibri"/>
-            </a:endParaRPr>
           </a:p>
         </p:txBody>
       </p:sp>
@@ -3178,6 +3408,7 @@
           <a:bodyPr anchor="ctr">
             <a:noAutofit/>
           </a:bodyPr>
+          <a:lstStyle/>
           <a:p>
             <a:pPr>
               <a:lnSpc>
@@ -3185,15 +3416,15 @@
               </a:lnSpc>
             </a:pPr>
             <a:fld id="{E5C5FB8E-70E5-43EA-8089-857C2831DBCD}" type="datetime">
-              <a:rPr b="0" lang="en-US" sz="770" spc="-1" strike="noStrike">
+              <a:rPr lang="en-US" sz="770" b="0" strike="noStrike" spc="-1">
                 <a:solidFill>
-                  <a:srgbClr val="8b8b8b"/>
+                  <a:srgbClr val="8B8B8B"/>
                 </a:solidFill>
                 <a:latin typeface="Calibri"/>
               </a:rPr>
-              <a:t>5/27/21</a:t>
+              <a:t>5/28/21</a:t>
             </a:fld>
-            <a:endParaRPr b="0" lang="en-US" sz="770" spc="-1" strike="noStrike">
+            <a:endParaRPr lang="en-US" sz="770" b="0" strike="noStrike" spc="-1">
               <a:latin typeface="Times New Roman"/>
             </a:endParaRPr>
           </a:p>
@@ -3222,8 +3453,9 @@
           <a:bodyPr anchor="ctr">
             <a:noAutofit/>
           </a:bodyPr>
-          <a:p>
-            <a:endParaRPr b="0" lang="en-US" sz="2400" spc="-1" strike="noStrike">
+          <a:lstStyle/>
+          <a:p>
+            <a:endParaRPr lang="en-US" sz="2400" b="0" strike="noStrike" spc="-1">
               <a:latin typeface="Times New Roman"/>
             </a:endParaRPr>
           </a:p>
@@ -3252,6 +3484,7 @@
           <a:bodyPr anchor="ctr">
             <a:noAutofit/>
           </a:bodyPr>
+          <a:lstStyle/>
           <a:p>
             <a:pPr algn="r">
               <a:lnSpc>
@@ -3259,15 +3492,15 @@
               </a:lnSpc>
             </a:pPr>
             <a:fld id="{CAACBD25-9508-4FBB-8E2E-7DB04F6922C3}" type="slidenum">
-              <a:rPr b="0" lang="en-US" sz="770" spc="-1" strike="noStrike">
+              <a:rPr lang="en-US" sz="770" b="0" strike="noStrike" spc="-1">
                 <a:solidFill>
-                  <a:srgbClr val="8b8b8b"/>
+                  <a:srgbClr val="8B8B8B"/>
                 </a:solidFill>
                 <a:latin typeface="Calibri"/>
               </a:rPr>
-              <a:t>&lt;number&gt;</a:t>
+              <a:t>‹#›</a:t>
             </a:fld>
-            <a:endParaRPr b="0" lang="en-US" sz="770" spc="-1" strike="noStrike">
+            <a:endParaRPr lang="en-US" sz="770" b="0" strike="noStrike" spc="-1">
               <a:latin typeface="Times New Roman"/>
             </a:endParaRPr>
           </a:p>
@@ -3275,32 +3508,313 @@
       </p:sp>
     </p:spTree>
   </p:cSld>
-  <p:clrMap bg1="lt1" bg2="lt2" tx1="dk1" tx2="dk2" accent1="accent1" accent2="accent2" accent3="accent3" accent4="accent4" accent5="accent5" accent6="accent6" hlink="hlink" folHlink="folHlink"/>
+  <p:clrMap bg1="lt1" tx1="dk1" bg2="lt2" tx2="dk2" accent1="accent1" accent2="accent2" accent3="accent3" accent4="accent4" accent5="accent5" accent6="accent6" hlink="hlink" folHlink="folHlink"/>
   <p:sldLayoutIdLst>
-    <p:sldLayoutId id="2147483649" r:id="rId2"/>
-    <p:sldLayoutId id="2147483650" r:id="rId3"/>
-    <p:sldLayoutId id="2147483651" r:id="rId4"/>
-    <p:sldLayoutId id="2147483652" r:id="rId5"/>
-    <p:sldLayoutId id="2147483653" r:id="rId6"/>
-    <p:sldLayoutId id="2147483654" r:id="rId7"/>
-    <p:sldLayoutId id="2147483655" r:id="rId8"/>
-    <p:sldLayoutId id="2147483656" r:id="rId9"/>
-    <p:sldLayoutId id="2147483657" r:id="rId10"/>
-    <p:sldLayoutId id="2147483658" r:id="rId11"/>
-    <p:sldLayoutId id="2147483659" r:id="rId12"/>
-    <p:sldLayoutId id="2147483660" r:id="rId13"/>
+    <p:sldLayoutId id="2147483649" r:id="rId1"/>
+    <p:sldLayoutId id="2147483650" r:id="rId2"/>
+    <p:sldLayoutId id="2147483651" r:id="rId3"/>
+    <p:sldLayoutId id="2147483652" r:id="rId4"/>
+    <p:sldLayoutId id="2147483653" r:id="rId5"/>
+    <p:sldLayoutId id="2147483654" r:id="rId6"/>
+    <p:sldLayoutId id="2147483655" r:id="rId7"/>
+    <p:sldLayoutId id="2147483656" r:id="rId8"/>
+    <p:sldLayoutId id="2147483657" r:id="rId9"/>
+    <p:sldLayoutId id="2147483658" r:id="rId10"/>
+    <p:sldLayoutId id="2147483659" r:id="rId11"/>
+    <p:sldLayoutId id="2147483660" r:id="rId12"/>
   </p:sldLayoutIdLst>
+  <p:txStyles>
+    <p:titleStyle>
+      <a:lvl1pPr algn="l" defTabSz="914400" rtl="0" eaLnBrk="1" latinLnBrk="0" hangingPunct="1">
+        <a:lnSpc>
+          <a:spcPct val="90000"/>
+        </a:lnSpc>
+        <a:spcBef>
+          <a:spcPct val="0"/>
+        </a:spcBef>
+        <a:buNone/>
+        <a:defRPr sz="4400" kern="1200">
+          <a:solidFill>
+            <a:schemeClr val="tx1"/>
+          </a:solidFill>
+          <a:latin typeface="+mj-lt"/>
+          <a:ea typeface="+mj-ea"/>
+          <a:cs typeface="+mj-cs"/>
+        </a:defRPr>
+      </a:lvl1pPr>
+    </p:titleStyle>
+    <p:bodyStyle>
+      <a:lvl1pPr marL="228600" indent="-228600" algn="l" defTabSz="914400" rtl="0" eaLnBrk="1" latinLnBrk="0" hangingPunct="1">
+        <a:lnSpc>
+          <a:spcPct val="90000"/>
+        </a:lnSpc>
+        <a:spcBef>
+          <a:spcPts val="1000"/>
+        </a:spcBef>
+        <a:buFont typeface="Arial"/>
+        <a:buChar char="•"/>
+        <a:defRPr sz="2800" kern="1200">
+          <a:solidFill>
+            <a:schemeClr val="tx1"/>
+          </a:solidFill>
+          <a:latin typeface="+mn-lt"/>
+          <a:ea typeface="+mn-ea"/>
+          <a:cs typeface="+mn-cs"/>
+        </a:defRPr>
+      </a:lvl1pPr>
+      <a:lvl2pPr marL="685800" indent="-228600" algn="l" defTabSz="914400" rtl="0" eaLnBrk="1" latinLnBrk="0" hangingPunct="1">
+        <a:lnSpc>
+          <a:spcPct val="90000"/>
+        </a:lnSpc>
+        <a:spcBef>
+          <a:spcPts val="500"/>
+        </a:spcBef>
+        <a:buFont typeface="Arial"/>
+        <a:buChar char="•"/>
+        <a:defRPr sz="2400" kern="1200">
+          <a:solidFill>
+            <a:schemeClr val="tx1"/>
+          </a:solidFill>
+          <a:latin typeface="+mn-lt"/>
+          <a:ea typeface="+mn-ea"/>
+          <a:cs typeface="+mn-cs"/>
+        </a:defRPr>
+      </a:lvl2pPr>
+      <a:lvl3pPr marL="1143000" indent="-228600" algn="l" defTabSz="914400" rtl="0" eaLnBrk="1" latinLnBrk="0" hangingPunct="1">
+        <a:lnSpc>
+          <a:spcPct val="90000"/>
+        </a:lnSpc>
+        <a:spcBef>
+          <a:spcPts val="500"/>
+        </a:spcBef>
+        <a:buFont typeface="Arial"/>
+        <a:buChar char="•"/>
+        <a:defRPr sz="2000" kern="1200">
+          <a:solidFill>
+            <a:schemeClr val="tx1"/>
+          </a:solidFill>
+          <a:latin typeface="+mn-lt"/>
+          <a:ea typeface="+mn-ea"/>
+          <a:cs typeface="+mn-cs"/>
+        </a:defRPr>
+      </a:lvl3pPr>
+      <a:lvl4pPr marL="1600200" indent="-228600" algn="l" defTabSz="914400" rtl="0" eaLnBrk="1" latinLnBrk="0" hangingPunct="1">
+        <a:lnSpc>
+          <a:spcPct val="90000"/>
+        </a:lnSpc>
+        <a:spcBef>
+          <a:spcPts val="500"/>
+        </a:spcBef>
+        <a:buFont typeface="Arial"/>
+        <a:buChar char="•"/>
+        <a:defRPr sz="1800" kern="1200">
+          <a:solidFill>
+            <a:schemeClr val="tx1"/>
+          </a:solidFill>
+          <a:latin typeface="+mn-lt"/>
+          <a:ea typeface="+mn-ea"/>
+          <a:cs typeface="+mn-cs"/>
+        </a:defRPr>
+      </a:lvl4pPr>
+      <a:lvl5pPr marL="2057400" indent="-228600" algn="l" defTabSz="914400" rtl="0" eaLnBrk="1" latinLnBrk="0" hangingPunct="1">
+        <a:lnSpc>
+          <a:spcPct val="90000"/>
+        </a:lnSpc>
+        <a:spcBef>
+          <a:spcPts val="500"/>
+        </a:spcBef>
+        <a:buFont typeface="Arial"/>
+        <a:buChar char="•"/>
+        <a:defRPr sz="1800" kern="1200">
+          <a:solidFill>
+            <a:schemeClr val="tx1"/>
+          </a:solidFill>
+          <a:latin typeface="+mn-lt"/>
+          <a:ea typeface="+mn-ea"/>
+          <a:cs typeface="+mn-cs"/>
+        </a:defRPr>
+      </a:lvl5pPr>
+      <a:lvl6pPr marL="2514600" indent="-228600" algn="l" defTabSz="914400" rtl="0" eaLnBrk="1" latinLnBrk="0" hangingPunct="1">
+        <a:lnSpc>
+          <a:spcPct val="90000"/>
+        </a:lnSpc>
+        <a:spcBef>
+          <a:spcPts val="500"/>
+        </a:spcBef>
+        <a:buFont typeface="Arial"/>
+        <a:buChar char="•"/>
+        <a:defRPr sz="1800" kern="1200">
+          <a:solidFill>
+            <a:schemeClr val="tx1"/>
+          </a:solidFill>
+          <a:latin typeface="+mn-lt"/>
+          <a:ea typeface="+mn-ea"/>
+          <a:cs typeface="+mn-cs"/>
+        </a:defRPr>
+      </a:lvl6pPr>
+      <a:lvl7pPr marL="2971800" indent="-228600" algn="l" defTabSz="914400" rtl="0" eaLnBrk="1" latinLnBrk="0" hangingPunct="1">
+        <a:lnSpc>
+          <a:spcPct val="90000"/>
+        </a:lnSpc>
+        <a:spcBef>
+          <a:spcPts val="500"/>
+        </a:spcBef>
+        <a:buFont typeface="Arial"/>
+        <a:buChar char="•"/>
+        <a:defRPr sz="1800" kern="1200">
+          <a:solidFill>
+            <a:schemeClr val="tx1"/>
+          </a:solidFill>
+          <a:latin typeface="+mn-lt"/>
+          <a:ea typeface="+mn-ea"/>
+          <a:cs typeface="+mn-cs"/>
+        </a:defRPr>
+      </a:lvl7pPr>
+      <a:lvl8pPr marL="3429000" indent="-228600" algn="l" defTabSz="914400" rtl="0" eaLnBrk="1" latinLnBrk="0" hangingPunct="1">
+        <a:lnSpc>
+          <a:spcPct val="90000"/>
+        </a:lnSpc>
+        <a:spcBef>
+          <a:spcPts val="500"/>
+        </a:spcBef>
+        <a:buFont typeface="Arial"/>
+        <a:buChar char="•"/>
+        <a:defRPr sz="1800" kern="1200">
+          <a:solidFill>
+            <a:schemeClr val="tx1"/>
+          </a:solidFill>
+          <a:latin typeface="+mn-lt"/>
+          <a:ea typeface="+mn-ea"/>
+          <a:cs typeface="+mn-cs"/>
+        </a:defRPr>
+      </a:lvl8pPr>
+      <a:lvl9pPr marL="3886200" indent="-228600" algn="l" defTabSz="914400" rtl="0" eaLnBrk="1" latinLnBrk="0" hangingPunct="1">
+        <a:lnSpc>
+          <a:spcPct val="90000"/>
+        </a:lnSpc>
+        <a:spcBef>
+          <a:spcPts val="500"/>
+        </a:spcBef>
+        <a:buFont typeface="Arial"/>
+        <a:buChar char="•"/>
+        <a:defRPr sz="1800" kern="1200">
+          <a:solidFill>
+            <a:schemeClr val="tx1"/>
+          </a:solidFill>
+          <a:latin typeface="+mn-lt"/>
+          <a:ea typeface="+mn-ea"/>
+          <a:cs typeface="+mn-cs"/>
+        </a:defRPr>
+      </a:lvl9pPr>
+    </p:bodyStyle>
+    <p:otherStyle>
+      <a:defPPr>
+        <a:defRPr lang="en-US"/>
+      </a:defPPr>
+      <a:lvl1pPr marL="0" algn="l" defTabSz="914400" rtl="0" eaLnBrk="1" latinLnBrk="0" hangingPunct="1">
+        <a:defRPr sz="1800" kern="1200">
+          <a:solidFill>
+            <a:schemeClr val="tx1"/>
+          </a:solidFill>
+          <a:latin typeface="+mn-lt"/>
+          <a:ea typeface="+mn-ea"/>
+          <a:cs typeface="+mn-cs"/>
+        </a:defRPr>
+      </a:lvl1pPr>
+      <a:lvl2pPr marL="457200" algn="l" defTabSz="914400" rtl="0" eaLnBrk="1" latinLnBrk="0" hangingPunct="1">
+        <a:defRPr sz="1800" kern="1200">
+          <a:solidFill>
+            <a:schemeClr val="tx1"/>
+          </a:solidFill>
+          <a:latin typeface="+mn-lt"/>
+          <a:ea typeface="+mn-ea"/>
+          <a:cs typeface="+mn-cs"/>
+        </a:defRPr>
+      </a:lvl2pPr>
+      <a:lvl3pPr marL="914400" algn="l" defTabSz="914400" rtl="0" eaLnBrk="1" latinLnBrk="0" hangingPunct="1">
+        <a:defRPr sz="1800" kern="1200">
+          <a:solidFill>
+            <a:schemeClr val="tx1"/>
+          </a:solidFill>
+          <a:latin typeface="+mn-lt"/>
+          <a:ea typeface="+mn-ea"/>
+          <a:cs typeface="+mn-cs"/>
+        </a:defRPr>
+      </a:lvl3pPr>
+      <a:lvl4pPr marL="1371600" algn="l" defTabSz="914400" rtl="0" eaLnBrk="1" latinLnBrk="0" hangingPunct="1">
+        <a:defRPr sz="1800" kern="1200">
+          <a:solidFill>
+            <a:schemeClr val="tx1"/>
+          </a:solidFill>
+          <a:latin typeface="+mn-lt"/>
+          <a:ea typeface="+mn-ea"/>
+          <a:cs typeface="+mn-cs"/>
+        </a:defRPr>
+      </a:lvl4pPr>
+      <a:lvl5pPr marL="1828800" algn="l" defTabSz="914400" rtl="0" eaLnBrk="1" latinLnBrk="0" hangingPunct="1">
+        <a:defRPr sz="1800" kern="1200">
+          <a:solidFill>
+            <a:schemeClr val="tx1"/>
+          </a:solidFill>
+          <a:latin typeface="+mn-lt"/>
+          <a:ea typeface="+mn-ea"/>
+          <a:cs typeface="+mn-cs"/>
+        </a:defRPr>
+      </a:lvl5pPr>
+      <a:lvl6pPr marL="2286000" algn="l" defTabSz="914400" rtl="0" eaLnBrk="1" latinLnBrk="0" hangingPunct="1">
+        <a:defRPr sz="1800" kern="1200">
+          <a:solidFill>
+            <a:schemeClr val="tx1"/>
+          </a:solidFill>
+          <a:latin typeface="+mn-lt"/>
+          <a:ea typeface="+mn-ea"/>
+          <a:cs typeface="+mn-cs"/>
+        </a:defRPr>
+      </a:lvl6pPr>
+      <a:lvl7pPr marL="2743200" algn="l" defTabSz="914400" rtl="0" eaLnBrk="1" latinLnBrk="0" hangingPunct="1">
+        <a:defRPr sz="1800" kern="1200">
+          <a:solidFill>
+            <a:schemeClr val="tx1"/>
+          </a:solidFill>
+          <a:latin typeface="+mn-lt"/>
+          <a:ea typeface="+mn-ea"/>
+          <a:cs typeface="+mn-cs"/>
+        </a:defRPr>
+      </a:lvl7pPr>
+      <a:lvl8pPr marL="3200400" algn="l" defTabSz="914400" rtl="0" eaLnBrk="1" latinLnBrk="0" hangingPunct="1">
+        <a:defRPr sz="1800" kern="1200">
+          <a:solidFill>
+            <a:schemeClr val="tx1"/>
+          </a:solidFill>
+          <a:latin typeface="+mn-lt"/>
+          <a:ea typeface="+mn-ea"/>
+          <a:cs typeface="+mn-cs"/>
+        </a:defRPr>
+      </a:lvl8pPr>
+      <a:lvl9pPr marL="3657600" algn="l" defTabSz="914400" rtl="0" eaLnBrk="1" latinLnBrk="0" hangingPunct="1">
+        <a:defRPr sz="1800" kern="1200">
+          <a:solidFill>
+            <a:schemeClr val="tx1"/>
+          </a:solidFill>
+          <a:latin typeface="+mn-lt"/>
+          <a:ea typeface="+mn-ea"/>
+          <a:cs typeface="+mn-cs"/>
+        </a:defRPr>
+      </a:lvl9pPr>
+    </p:otherStyle>
+  </p:txStyles>
 </p:sldMaster>
 </file>
 
 <file path=ppt/slideMasters/slideMaster2.xml><?xml version="1.0" encoding="utf-8"?>
-<p:sldMaster xmlns:a="http://schemas.openxmlformats.org/drawingml/2006/main" xmlns:p="http://schemas.openxmlformats.org/presentationml/2006/main" xmlns:r="http://schemas.openxmlformats.org/officeDocument/2006/relationships" xmlns:p14="http://schemas.microsoft.com/office/powerpoint/2010/main" xmlns:p15="http://schemas.microsoft.com/office/powerpoint/2012/main" xmlns:mc="http://schemas.openxmlformats.org/markup-compatibility/2006">
+<p:sldMaster xmlns:a="http://schemas.openxmlformats.org/drawingml/2006/main" xmlns:r="http://schemas.openxmlformats.org/officeDocument/2006/relationships" xmlns:p="http://schemas.openxmlformats.org/presentationml/2006/main">
   <p:cSld>
     <p:bg>
       <p:bgPr>
         <a:solidFill>
-          <a:srgbClr val="ffffff"/>
+          <a:srgbClr val="FFFFFF"/>
         </a:solidFill>
+        <a:effectLst/>
       </p:bgPr>
     </p:bg>
     <p:spTree>
@@ -3340,6 +3854,7 @@
           <a:bodyPr anchor="b">
             <a:noAutofit/>
           </a:bodyPr>
+          <a:lstStyle/>
           <a:p>
             <a:pPr algn="ctr">
               <a:lnSpc>
@@ -3347,7 +3862,7 @@
               </a:lnSpc>
             </a:pPr>
             <a:r>
-              <a:rPr b="0" lang="en-US" sz="3830" spc="-1" strike="noStrike">
+              <a:rPr lang="en-US" sz="3830" b="0" strike="noStrike" spc="-1">
                 <a:solidFill>
                   <a:srgbClr val="000000"/>
                 </a:solidFill>
@@ -3355,7 +3870,7 @@
               </a:rPr>
               <a:t>Click to edit Master title style</a:t>
             </a:r>
-            <a:endParaRPr b="0" lang="en-US" sz="3830" spc="-1" strike="noStrike">
+            <a:endParaRPr lang="en-US" sz="3830" b="0" strike="noStrike" spc="-1">
               <a:solidFill>
                 <a:srgbClr val="000000"/>
               </a:solidFill>
@@ -3387,6 +3902,7 @@
           <a:bodyPr anchor="ctr">
             <a:noAutofit/>
           </a:bodyPr>
+          <a:lstStyle/>
           <a:p>
             <a:pPr>
               <a:lnSpc>
@@ -3394,15 +3910,15 @@
               </a:lnSpc>
             </a:pPr>
             <a:fld id="{B57ADDF8-DA94-4E13-AAF5-5A46836EAA46}" type="datetime">
-              <a:rPr b="0" lang="en-US" sz="770" spc="-1" strike="noStrike">
+              <a:rPr lang="en-US" sz="770" b="0" strike="noStrike" spc="-1">
                 <a:solidFill>
-                  <a:srgbClr val="8b8b8b"/>
+                  <a:srgbClr val="8B8B8B"/>
                 </a:solidFill>
                 <a:latin typeface="Calibri"/>
               </a:rPr>
-              <a:t>5/27/21</a:t>
+              <a:t>5/28/21</a:t>
             </a:fld>
-            <a:endParaRPr b="0" lang="en-US" sz="770" spc="-1" strike="noStrike">
+            <a:endParaRPr lang="en-US" sz="770" b="0" strike="noStrike" spc="-1">
               <a:latin typeface="Times New Roman"/>
             </a:endParaRPr>
           </a:p>
@@ -3431,8 +3947,9 @@
           <a:bodyPr anchor="ctr">
             <a:noAutofit/>
           </a:bodyPr>
-          <a:p>
-            <a:endParaRPr b="0" lang="en-US" sz="2400" spc="-1" strike="noStrike">
+          <a:lstStyle/>
+          <a:p>
+            <a:endParaRPr lang="en-US" sz="2400" b="0" strike="noStrike" spc="-1">
               <a:latin typeface="Times New Roman"/>
             </a:endParaRPr>
           </a:p>
@@ -3461,6 +3978,7 @@
           <a:bodyPr anchor="ctr">
             <a:noAutofit/>
           </a:bodyPr>
+          <a:lstStyle/>
           <a:p>
             <a:pPr algn="r">
               <a:lnSpc>
@@ -3468,15 +3986,15 @@
               </a:lnSpc>
             </a:pPr>
             <a:fld id="{BA2189B2-B1AA-4392-A913-10E52F5079ED}" type="slidenum">
-              <a:rPr b="0" lang="en-US" sz="770" spc="-1" strike="noStrike">
+              <a:rPr lang="en-US" sz="770" b="0" strike="noStrike" spc="-1">
                 <a:solidFill>
-                  <a:srgbClr val="8b8b8b"/>
+                  <a:srgbClr val="8B8B8B"/>
                 </a:solidFill>
                 <a:latin typeface="Calibri"/>
               </a:rPr>
-              <a:t>&lt;number&gt;</a:t>
+              <a:t>‹#›</a:t>
             </a:fld>
-            <a:endParaRPr b="0" lang="en-US" sz="770" spc="-1" strike="noStrike">
+            <a:endParaRPr lang="en-US" sz="770" b="0" strike="noStrike" spc="-1">
               <a:latin typeface="Times New Roman"/>
             </a:endParaRPr>
           </a:p>
@@ -3502,9 +4020,10 @@
           </a:prstGeom>
         </p:spPr>
         <p:txBody>
-          <a:bodyPr lIns="0" rIns="0" tIns="0" bIns="0">
+          <a:bodyPr lIns="0" tIns="0" rIns="0" bIns="0">
             <a:normAutofit/>
           </a:bodyPr>
+          <a:lstStyle/>
           <a:p>
             <a:pPr marL="432000" indent="-324000">
               <a:spcBef>
@@ -3518,7 +4037,7 @@
               <a:buChar char=""/>
             </a:pPr>
             <a:r>
-              <a:rPr b="0" lang="en-US" sz="1790" spc="-1" strike="noStrike">
+              <a:rPr lang="en-US" sz="1790" b="0" strike="noStrike" spc="-1">
                 <a:solidFill>
                   <a:srgbClr val="000000"/>
                 </a:solidFill>
@@ -3526,15 +4045,9 @@
               </a:rPr>
               <a:t>Click to edit the outline text format</a:t>
             </a:r>
-            <a:endParaRPr b="0" lang="en-US" sz="1790" spc="-1" strike="noStrike">
-              <a:solidFill>
-                <a:srgbClr val="000000"/>
-              </a:solidFill>
-              <a:latin typeface="Calibri"/>
-            </a:endParaRPr>
-          </a:p>
-          <a:p>
-            <a:pPr lvl="1" marL="864000" indent="-324000">
+          </a:p>
+          <a:p>
+            <a:pPr marL="864000" lvl="1" indent="-324000">
               <a:spcBef>
                 <a:spcPts val="1134"/>
               </a:spcBef>
@@ -3546,7 +4059,7 @@
               <a:buChar char=""/>
             </a:pPr>
             <a:r>
-              <a:rPr b="0" lang="en-US" sz="1280" spc="-1" strike="noStrike">
+              <a:rPr lang="en-US" sz="1280" b="0" strike="noStrike" spc="-1">
                 <a:solidFill>
                   <a:srgbClr val="000000"/>
                 </a:solidFill>
@@ -3554,15 +4067,9 @@
               </a:rPr>
               <a:t>Second Outline Level</a:t>
             </a:r>
-            <a:endParaRPr b="0" lang="en-US" sz="1280" spc="-1" strike="noStrike">
-              <a:solidFill>
-                <a:srgbClr val="000000"/>
-              </a:solidFill>
-              <a:latin typeface="Calibri"/>
-            </a:endParaRPr>
-          </a:p>
-          <a:p>
-            <a:pPr lvl="2" marL="1296000" indent="-288000">
+          </a:p>
+          <a:p>
+            <a:pPr marL="1296000" lvl="2" indent="-288000">
               <a:spcBef>
                 <a:spcPts val="850"/>
               </a:spcBef>
@@ -3574,7 +4081,7 @@
               <a:buChar char=""/>
             </a:pPr>
             <a:r>
-              <a:rPr b="0" lang="en-US" sz="1150" spc="-1" strike="noStrike">
+              <a:rPr lang="en-US" sz="1150" b="0" strike="noStrike" spc="-1">
                 <a:solidFill>
                   <a:srgbClr val="000000"/>
                 </a:solidFill>
@@ -3582,15 +4089,9 @@
               </a:rPr>
               <a:t>Third Outline Level</a:t>
             </a:r>
-            <a:endParaRPr b="0" lang="en-US" sz="1150" spc="-1" strike="noStrike">
-              <a:solidFill>
-                <a:srgbClr val="000000"/>
-              </a:solidFill>
-              <a:latin typeface="Calibri"/>
-            </a:endParaRPr>
-          </a:p>
-          <a:p>
-            <a:pPr lvl="3" marL="1728000" indent="-216000">
+          </a:p>
+          <a:p>
+            <a:pPr marL="1728000" lvl="3" indent="-216000">
               <a:spcBef>
                 <a:spcPts val="567"/>
               </a:spcBef>
@@ -3602,7 +4103,7 @@
               <a:buChar char=""/>
             </a:pPr>
             <a:r>
-              <a:rPr b="0" lang="en-US" sz="1150" spc="-1" strike="noStrike">
+              <a:rPr lang="en-US" sz="1150" b="0" strike="noStrike" spc="-1">
                 <a:solidFill>
                   <a:srgbClr val="000000"/>
                 </a:solidFill>
@@ -3610,15 +4111,9 @@
               </a:rPr>
               <a:t>Fourth Outline Level</a:t>
             </a:r>
-            <a:endParaRPr b="0" lang="en-US" sz="1150" spc="-1" strike="noStrike">
-              <a:solidFill>
-                <a:srgbClr val="000000"/>
-              </a:solidFill>
-              <a:latin typeface="Calibri"/>
-            </a:endParaRPr>
-          </a:p>
-          <a:p>
-            <a:pPr lvl="4" marL="2160000" indent="-216000">
+          </a:p>
+          <a:p>
+            <a:pPr marL="2160000" lvl="4" indent="-216000">
               <a:spcBef>
                 <a:spcPts val="283"/>
               </a:spcBef>
@@ -3630,7 +4125,7 @@
               <a:buChar char=""/>
             </a:pPr>
             <a:r>
-              <a:rPr b="0" lang="en-US" sz="2000" spc="-1" strike="noStrike">
+              <a:rPr lang="en-US" sz="2000" b="0" strike="noStrike" spc="-1">
                 <a:solidFill>
                   <a:srgbClr val="000000"/>
                 </a:solidFill>
@@ -3638,15 +4133,9 @@
               </a:rPr>
               <a:t>Fifth Outline Level</a:t>
             </a:r>
-            <a:endParaRPr b="0" lang="en-US" sz="2000" spc="-1" strike="noStrike">
-              <a:solidFill>
-                <a:srgbClr val="000000"/>
-              </a:solidFill>
-              <a:latin typeface="Calibri"/>
-            </a:endParaRPr>
-          </a:p>
-          <a:p>
-            <a:pPr lvl="5" marL="2592000" indent="-216000">
+          </a:p>
+          <a:p>
+            <a:pPr marL="2592000" lvl="5" indent="-216000">
               <a:spcBef>
                 <a:spcPts val="283"/>
               </a:spcBef>
@@ -3658,7 +4147,7 @@
               <a:buChar char=""/>
             </a:pPr>
             <a:r>
-              <a:rPr b="0" lang="en-US" sz="2000" spc="-1" strike="noStrike">
+              <a:rPr lang="en-US" sz="2000" b="0" strike="noStrike" spc="-1">
                 <a:solidFill>
                   <a:srgbClr val="000000"/>
                 </a:solidFill>
@@ -3666,15 +4155,9 @@
               </a:rPr>
               <a:t>Sixth Outline Level</a:t>
             </a:r>
-            <a:endParaRPr b="0" lang="en-US" sz="2000" spc="-1" strike="noStrike">
-              <a:solidFill>
-                <a:srgbClr val="000000"/>
-              </a:solidFill>
-              <a:latin typeface="Calibri"/>
-            </a:endParaRPr>
-          </a:p>
-          <a:p>
-            <a:pPr lvl="6" marL="3024000" indent="-216000">
+          </a:p>
+          <a:p>
+            <a:pPr marL="3024000" lvl="6" indent="-216000">
               <a:spcBef>
                 <a:spcPts val="283"/>
               </a:spcBef>
@@ -3686,7 +4169,7 @@
               <a:buChar char=""/>
             </a:pPr>
             <a:r>
-              <a:rPr b="0" lang="en-US" sz="2000" spc="-1" strike="noStrike">
+              <a:rPr lang="en-US" sz="2000" b="0" strike="noStrike" spc="-1">
                 <a:solidFill>
                   <a:srgbClr val="000000"/>
                 </a:solidFill>
@@ -3694,37 +4177,311 @@
               </a:rPr>
               <a:t>Seventh Outline Level</a:t>
             </a:r>
-            <a:endParaRPr b="0" lang="en-US" sz="2000" spc="-1" strike="noStrike">
-              <a:solidFill>
-                <a:srgbClr val="000000"/>
-              </a:solidFill>
-              <a:latin typeface="Calibri"/>
-            </a:endParaRPr>
           </a:p>
         </p:txBody>
       </p:sp>
     </p:spTree>
   </p:cSld>
-  <p:clrMap bg1="lt1" bg2="lt2" tx1="dk1" tx2="dk2" accent1="accent1" accent2="accent2" accent3="accent3" accent4="accent4" accent5="accent5" accent6="accent6" hlink="hlink" folHlink="folHlink"/>
+  <p:clrMap bg1="lt1" tx1="dk1" bg2="lt2" tx2="dk2" accent1="accent1" accent2="accent2" accent3="accent3" accent4="accent4" accent5="accent5" accent6="accent6" hlink="hlink" folHlink="folHlink"/>
   <p:sldLayoutIdLst>
-    <p:sldLayoutId id="2147483662" r:id="rId2"/>
-    <p:sldLayoutId id="2147483663" r:id="rId3"/>
-    <p:sldLayoutId id="2147483664" r:id="rId4"/>
-    <p:sldLayoutId id="2147483665" r:id="rId5"/>
-    <p:sldLayoutId id="2147483666" r:id="rId6"/>
-    <p:sldLayoutId id="2147483667" r:id="rId7"/>
-    <p:sldLayoutId id="2147483668" r:id="rId8"/>
-    <p:sldLayoutId id="2147483669" r:id="rId9"/>
-    <p:sldLayoutId id="2147483670" r:id="rId10"/>
-    <p:sldLayoutId id="2147483671" r:id="rId11"/>
-    <p:sldLayoutId id="2147483672" r:id="rId12"/>
-    <p:sldLayoutId id="2147483673" r:id="rId13"/>
+    <p:sldLayoutId id="2147483662" r:id="rId1"/>
+    <p:sldLayoutId id="2147483663" r:id="rId2"/>
+    <p:sldLayoutId id="2147483664" r:id="rId3"/>
+    <p:sldLayoutId id="2147483665" r:id="rId4"/>
+    <p:sldLayoutId id="2147483666" r:id="rId5"/>
+    <p:sldLayoutId id="2147483667" r:id="rId6"/>
+    <p:sldLayoutId id="2147483668" r:id="rId7"/>
+    <p:sldLayoutId id="2147483669" r:id="rId8"/>
+    <p:sldLayoutId id="2147483670" r:id="rId9"/>
+    <p:sldLayoutId id="2147483671" r:id="rId10"/>
+    <p:sldLayoutId id="2147483672" r:id="rId11"/>
+    <p:sldLayoutId id="2147483673" r:id="rId12"/>
   </p:sldLayoutIdLst>
+  <p:txStyles>
+    <p:titleStyle>
+      <a:lvl1pPr algn="l" defTabSz="914400" rtl="0" eaLnBrk="1" latinLnBrk="0" hangingPunct="1">
+        <a:lnSpc>
+          <a:spcPct val="90000"/>
+        </a:lnSpc>
+        <a:spcBef>
+          <a:spcPct val="0"/>
+        </a:spcBef>
+        <a:buNone/>
+        <a:defRPr sz="4400" kern="1200">
+          <a:solidFill>
+            <a:schemeClr val="tx1"/>
+          </a:solidFill>
+          <a:latin typeface="+mj-lt"/>
+          <a:ea typeface="+mj-ea"/>
+          <a:cs typeface="+mj-cs"/>
+        </a:defRPr>
+      </a:lvl1pPr>
+    </p:titleStyle>
+    <p:bodyStyle>
+      <a:lvl1pPr marL="228600" indent="-228600" algn="l" defTabSz="914400" rtl="0" eaLnBrk="1" latinLnBrk="0" hangingPunct="1">
+        <a:lnSpc>
+          <a:spcPct val="90000"/>
+        </a:lnSpc>
+        <a:spcBef>
+          <a:spcPts val="1000"/>
+        </a:spcBef>
+        <a:buFont typeface="Arial"/>
+        <a:buChar char="•"/>
+        <a:defRPr sz="2800" kern="1200">
+          <a:solidFill>
+            <a:schemeClr val="tx1"/>
+          </a:solidFill>
+          <a:latin typeface="+mn-lt"/>
+          <a:ea typeface="+mn-ea"/>
+          <a:cs typeface="+mn-cs"/>
+        </a:defRPr>
+      </a:lvl1pPr>
+      <a:lvl2pPr marL="685800" indent="-228600" algn="l" defTabSz="914400" rtl="0" eaLnBrk="1" latinLnBrk="0" hangingPunct="1">
+        <a:lnSpc>
+          <a:spcPct val="90000"/>
+        </a:lnSpc>
+        <a:spcBef>
+          <a:spcPts val="500"/>
+        </a:spcBef>
+        <a:buFont typeface="Arial"/>
+        <a:buChar char="•"/>
+        <a:defRPr sz="2400" kern="1200">
+          <a:solidFill>
+            <a:schemeClr val="tx1"/>
+          </a:solidFill>
+          <a:latin typeface="+mn-lt"/>
+          <a:ea typeface="+mn-ea"/>
+          <a:cs typeface="+mn-cs"/>
+        </a:defRPr>
+      </a:lvl2pPr>
+      <a:lvl3pPr marL="1143000" indent="-228600" algn="l" defTabSz="914400" rtl="0" eaLnBrk="1" latinLnBrk="0" hangingPunct="1">
+        <a:lnSpc>
+          <a:spcPct val="90000"/>
+        </a:lnSpc>
+        <a:spcBef>
+          <a:spcPts val="500"/>
+        </a:spcBef>
+        <a:buFont typeface="Arial"/>
+        <a:buChar char="•"/>
+        <a:defRPr sz="2000" kern="1200">
+          <a:solidFill>
+            <a:schemeClr val="tx1"/>
+          </a:solidFill>
+          <a:latin typeface="+mn-lt"/>
+          <a:ea typeface="+mn-ea"/>
+          <a:cs typeface="+mn-cs"/>
+        </a:defRPr>
+      </a:lvl3pPr>
+      <a:lvl4pPr marL="1600200" indent="-228600" algn="l" defTabSz="914400" rtl="0" eaLnBrk="1" latinLnBrk="0" hangingPunct="1">
+        <a:lnSpc>
+          <a:spcPct val="90000"/>
+        </a:lnSpc>
+        <a:spcBef>
+          <a:spcPts val="500"/>
+        </a:spcBef>
+        <a:buFont typeface="Arial"/>
+        <a:buChar char="•"/>
+        <a:defRPr sz="1800" kern="1200">
+          <a:solidFill>
+            <a:schemeClr val="tx1"/>
+          </a:solidFill>
+          <a:latin typeface="+mn-lt"/>
+          <a:ea typeface="+mn-ea"/>
+          <a:cs typeface="+mn-cs"/>
+        </a:defRPr>
+      </a:lvl4pPr>
+      <a:lvl5pPr marL="2057400" indent="-228600" algn="l" defTabSz="914400" rtl="0" eaLnBrk="1" latinLnBrk="0" hangingPunct="1">
+        <a:lnSpc>
+          <a:spcPct val="90000"/>
+        </a:lnSpc>
+        <a:spcBef>
+          <a:spcPts val="500"/>
+        </a:spcBef>
+        <a:buFont typeface="Arial"/>
+        <a:buChar char="•"/>
+        <a:defRPr sz="1800" kern="1200">
+          <a:solidFill>
+            <a:schemeClr val="tx1"/>
+          </a:solidFill>
+          <a:latin typeface="+mn-lt"/>
+          <a:ea typeface="+mn-ea"/>
+          <a:cs typeface="+mn-cs"/>
+        </a:defRPr>
+      </a:lvl5pPr>
+      <a:lvl6pPr marL="2514600" indent="-228600" algn="l" defTabSz="914400" rtl="0" eaLnBrk="1" latinLnBrk="0" hangingPunct="1">
+        <a:lnSpc>
+          <a:spcPct val="90000"/>
+        </a:lnSpc>
+        <a:spcBef>
+          <a:spcPts val="500"/>
+        </a:spcBef>
+        <a:buFont typeface="Arial"/>
+        <a:buChar char="•"/>
+        <a:defRPr sz="1800" kern="1200">
+          <a:solidFill>
+            <a:schemeClr val="tx1"/>
+          </a:solidFill>
+          <a:latin typeface="+mn-lt"/>
+          <a:ea typeface="+mn-ea"/>
+          <a:cs typeface="+mn-cs"/>
+        </a:defRPr>
+      </a:lvl6pPr>
+      <a:lvl7pPr marL="2971800" indent="-228600" algn="l" defTabSz="914400" rtl="0" eaLnBrk="1" latinLnBrk="0" hangingPunct="1">
+        <a:lnSpc>
+          <a:spcPct val="90000"/>
+        </a:lnSpc>
+        <a:spcBef>
+          <a:spcPts val="500"/>
+        </a:spcBef>
+        <a:buFont typeface="Arial"/>
+        <a:buChar char="•"/>
+        <a:defRPr sz="1800" kern="1200">
+          <a:solidFill>
+            <a:schemeClr val="tx1"/>
+          </a:solidFill>
+          <a:latin typeface="+mn-lt"/>
+          <a:ea typeface="+mn-ea"/>
+          <a:cs typeface="+mn-cs"/>
+        </a:defRPr>
+      </a:lvl7pPr>
+      <a:lvl8pPr marL="3429000" indent="-228600" algn="l" defTabSz="914400" rtl="0" eaLnBrk="1" latinLnBrk="0" hangingPunct="1">
+        <a:lnSpc>
+          <a:spcPct val="90000"/>
+        </a:lnSpc>
+        <a:spcBef>
+          <a:spcPts val="500"/>
+        </a:spcBef>
+        <a:buFont typeface="Arial"/>
+        <a:buChar char="•"/>
+        <a:defRPr sz="1800" kern="1200">
+          <a:solidFill>
+            <a:schemeClr val="tx1"/>
+          </a:solidFill>
+          <a:latin typeface="+mn-lt"/>
+          <a:ea typeface="+mn-ea"/>
+          <a:cs typeface="+mn-cs"/>
+        </a:defRPr>
+      </a:lvl8pPr>
+      <a:lvl9pPr marL="3886200" indent="-228600" algn="l" defTabSz="914400" rtl="0" eaLnBrk="1" latinLnBrk="0" hangingPunct="1">
+        <a:lnSpc>
+          <a:spcPct val="90000"/>
+        </a:lnSpc>
+        <a:spcBef>
+          <a:spcPts val="500"/>
+        </a:spcBef>
+        <a:buFont typeface="Arial"/>
+        <a:buChar char="•"/>
+        <a:defRPr sz="1800" kern="1200">
+          <a:solidFill>
+            <a:schemeClr val="tx1"/>
+          </a:solidFill>
+          <a:latin typeface="+mn-lt"/>
+          <a:ea typeface="+mn-ea"/>
+          <a:cs typeface="+mn-cs"/>
+        </a:defRPr>
+      </a:lvl9pPr>
+    </p:bodyStyle>
+    <p:otherStyle>
+      <a:defPPr>
+        <a:defRPr lang="en-US"/>
+      </a:defPPr>
+      <a:lvl1pPr marL="0" algn="l" defTabSz="914400" rtl="0" eaLnBrk="1" latinLnBrk="0" hangingPunct="1">
+        <a:defRPr sz="1800" kern="1200">
+          <a:solidFill>
+            <a:schemeClr val="tx1"/>
+          </a:solidFill>
+          <a:latin typeface="+mn-lt"/>
+          <a:ea typeface="+mn-ea"/>
+          <a:cs typeface="+mn-cs"/>
+        </a:defRPr>
+      </a:lvl1pPr>
+      <a:lvl2pPr marL="457200" algn="l" defTabSz="914400" rtl="0" eaLnBrk="1" latinLnBrk="0" hangingPunct="1">
+        <a:defRPr sz="1800" kern="1200">
+          <a:solidFill>
+            <a:schemeClr val="tx1"/>
+          </a:solidFill>
+          <a:latin typeface="+mn-lt"/>
+          <a:ea typeface="+mn-ea"/>
+          <a:cs typeface="+mn-cs"/>
+        </a:defRPr>
+      </a:lvl2pPr>
+      <a:lvl3pPr marL="914400" algn="l" defTabSz="914400" rtl="0" eaLnBrk="1" latinLnBrk="0" hangingPunct="1">
+        <a:defRPr sz="1800" kern="1200">
+          <a:solidFill>
+            <a:schemeClr val="tx1"/>
+          </a:solidFill>
+          <a:latin typeface="+mn-lt"/>
+          <a:ea typeface="+mn-ea"/>
+          <a:cs typeface="+mn-cs"/>
+        </a:defRPr>
+      </a:lvl3pPr>
+      <a:lvl4pPr marL="1371600" algn="l" defTabSz="914400" rtl="0" eaLnBrk="1" latinLnBrk="0" hangingPunct="1">
+        <a:defRPr sz="1800" kern="1200">
+          <a:solidFill>
+            <a:schemeClr val="tx1"/>
+          </a:solidFill>
+          <a:latin typeface="+mn-lt"/>
+          <a:ea typeface="+mn-ea"/>
+          <a:cs typeface="+mn-cs"/>
+        </a:defRPr>
+      </a:lvl4pPr>
+      <a:lvl5pPr marL="1828800" algn="l" defTabSz="914400" rtl="0" eaLnBrk="1" latinLnBrk="0" hangingPunct="1">
+        <a:defRPr sz="1800" kern="1200">
+          <a:solidFill>
+            <a:schemeClr val="tx1"/>
+          </a:solidFill>
+          <a:latin typeface="+mn-lt"/>
+          <a:ea typeface="+mn-ea"/>
+          <a:cs typeface="+mn-cs"/>
+        </a:defRPr>
+      </a:lvl5pPr>
+      <a:lvl6pPr marL="2286000" algn="l" defTabSz="914400" rtl="0" eaLnBrk="1" latinLnBrk="0" hangingPunct="1">
+        <a:defRPr sz="1800" kern="1200">
+          <a:solidFill>
+            <a:schemeClr val="tx1"/>
+          </a:solidFill>
+          <a:latin typeface="+mn-lt"/>
+          <a:ea typeface="+mn-ea"/>
+          <a:cs typeface="+mn-cs"/>
+        </a:defRPr>
+      </a:lvl6pPr>
+      <a:lvl7pPr marL="2743200" algn="l" defTabSz="914400" rtl="0" eaLnBrk="1" latinLnBrk="0" hangingPunct="1">
+        <a:defRPr sz="1800" kern="1200">
+          <a:solidFill>
+            <a:schemeClr val="tx1"/>
+          </a:solidFill>
+          <a:latin typeface="+mn-lt"/>
+          <a:ea typeface="+mn-ea"/>
+          <a:cs typeface="+mn-cs"/>
+        </a:defRPr>
+      </a:lvl7pPr>
+      <a:lvl8pPr marL="3200400" algn="l" defTabSz="914400" rtl="0" eaLnBrk="1" latinLnBrk="0" hangingPunct="1">
+        <a:defRPr sz="1800" kern="1200">
+          <a:solidFill>
+            <a:schemeClr val="tx1"/>
+          </a:solidFill>
+          <a:latin typeface="+mn-lt"/>
+          <a:ea typeface="+mn-ea"/>
+          <a:cs typeface="+mn-cs"/>
+        </a:defRPr>
+      </a:lvl8pPr>
+      <a:lvl9pPr marL="3657600" algn="l" defTabSz="914400" rtl="0" eaLnBrk="1" latinLnBrk="0" hangingPunct="1">
+        <a:defRPr sz="1800" kern="1200">
+          <a:solidFill>
+            <a:schemeClr val="tx1"/>
+          </a:solidFill>
+          <a:latin typeface="+mn-lt"/>
+          <a:ea typeface="+mn-ea"/>
+          <a:cs typeface="+mn-cs"/>
+        </a:defRPr>
+      </a:lvl9pPr>
+    </p:otherStyle>
+  </p:txStyles>
 </p:sldMaster>
 </file>
 
 <file path=ppt/slides/slide1.xml><?xml version="1.0" encoding="utf-8"?>
-<p:sld xmlns:a="http://schemas.openxmlformats.org/drawingml/2006/main" xmlns:p="http://schemas.openxmlformats.org/presentationml/2006/main" xmlns:r="http://schemas.openxmlformats.org/officeDocument/2006/relationships" xmlns:p14="http://schemas.microsoft.com/office/powerpoint/2010/main" xmlns:p15="http://schemas.microsoft.com/office/powerpoint/2012/main" xmlns:mc="http://schemas.openxmlformats.org/markup-compatibility/2006">
+<p:sld xmlns:a="http://schemas.openxmlformats.org/drawingml/2006/main" xmlns:r="http://schemas.openxmlformats.org/officeDocument/2006/relationships" xmlns:p="http://schemas.openxmlformats.org/presentationml/2006/main">
   <p:cSld>
     <p:spTree>
       <p:nvGrpSpPr>
@@ -3756,12 +4513,12 @@
         </p:grpSpPr>
         <p:pic>
           <p:nvPicPr>
-            <p:cNvPr id="83" name="Picture 14" descr=""/>
+            <p:cNvPr id="83" name="Picture 14"/>
             <p:cNvPicPr/>
             <p:nvPr/>
           </p:nvPicPr>
           <p:blipFill>
-            <a:blip r:embed="rId1"/>
+            <a:blip r:embed="rId2"/>
             <a:stretch/>
           </p:blipFill>
           <p:spPr>
@@ -3797,15 +4554,22 @@
             </a:ln>
           </p:spPr>
           <p:style>
-            <a:lnRef idx="0"/>
-            <a:fillRef idx="0"/>
-            <a:effectRef idx="0"/>
+            <a:lnRef idx="0">
+              <a:scrgbClr r="0" g="0" b="0"/>
+            </a:lnRef>
+            <a:fillRef idx="0">
+              <a:scrgbClr r="0" g="0" b="0"/>
+            </a:fillRef>
+            <a:effectRef idx="0">
+              <a:scrgbClr r="0" g="0" b="0"/>
+            </a:effectRef>
             <a:fontRef idx="minor"/>
           </p:style>
           <p:txBody>
-            <a:bodyPr wrap="none" lIns="90000" rIns="90000" tIns="45000" bIns="45000">
+            <a:bodyPr wrap="none" lIns="90000" tIns="45000" rIns="90000" bIns="45000">
               <a:spAutoFit/>
             </a:bodyPr>
+            <a:lstStyle/>
             <a:p>
               <a:pPr>
                 <a:lnSpc>
@@ -3813,7 +4577,7 @@
                 </a:lnSpc>
               </a:pPr>
               <a:r>
-                <a:rPr b="0" lang="en-US" sz="700" spc="-1" strike="noStrike">
+                <a:rPr lang="en-US" sz="700" b="0" strike="noStrike" spc="-1">
                   <a:solidFill>
                     <a:srgbClr val="000000"/>
                   </a:solidFill>
@@ -3821,7 +4585,7 @@
                 </a:rPr>
                 <a:t>© step2 (push around buggy)</a:t>
               </a:r>
-              <a:endParaRPr b="0" lang="en-US" sz="700" spc="-1" strike="noStrike">
+              <a:endParaRPr lang="en-US" sz="700" b="0" strike="noStrike" spc="-1">
                 <a:latin typeface="Arial"/>
               </a:endParaRPr>
             </a:p>
@@ -3829,12 +4593,12 @@
         </p:sp>
         <p:pic>
           <p:nvPicPr>
-            <p:cNvPr id="85" name="Picture 5" descr=""/>
+            <p:cNvPr id="85" name="Picture 5"/>
             <p:cNvPicPr/>
             <p:nvPr/>
           </p:nvPicPr>
           <p:blipFill>
-            <a:blip r:embed="rId2"/>
+            <a:blip r:embed="rId3"/>
             <a:stretch/>
           </p:blipFill>
           <p:spPr>
@@ -3870,15 +4634,22 @@
             </a:ln>
           </p:spPr>
           <p:style>
-            <a:lnRef idx="0"/>
-            <a:fillRef idx="0"/>
-            <a:effectRef idx="0"/>
+            <a:lnRef idx="0">
+              <a:scrgbClr r="0" g="0" b="0"/>
+            </a:lnRef>
+            <a:fillRef idx="0">
+              <a:scrgbClr r="0" g="0" b="0"/>
+            </a:fillRef>
+            <a:effectRef idx="0">
+              <a:scrgbClr r="0" g="0" b="0"/>
+            </a:effectRef>
             <a:fontRef idx="minor"/>
           </p:style>
           <p:txBody>
-            <a:bodyPr wrap="none" lIns="90000" rIns="90000" tIns="45000" bIns="45000">
+            <a:bodyPr wrap="none" lIns="90000" tIns="45000" rIns="90000" bIns="45000">
               <a:spAutoFit/>
             </a:bodyPr>
+            <a:lstStyle/>
             <a:p>
               <a:pPr>
                 <a:lnSpc>
@@ -3886,7 +4657,7 @@
                 </a:lnSpc>
               </a:pPr>
               <a:r>
-                <a:rPr b="0" lang="en-US" sz="700" spc="-1" strike="noStrike">
+                <a:rPr lang="en-US" sz="700" b="0" strike="noStrike" spc="-1">
                   <a:solidFill>
                     <a:srgbClr val="000000"/>
                   </a:solidFill>
@@ -3894,7 +4665,7 @@
                 </a:rPr>
                 <a:t>© WAYMO</a:t>
               </a:r>
-              <a:endParaRPr b="0" lang="en-US" sz="700" spc="-1" strike="noStrike">
+              <a:endParaRPr lang="en-US" sz="700" b="0" strike="noStrike" spc="-1">
                 <a:latin typeface="Arial"/>
               </a:endParaRPr>
             </a:p>
@@ -3920,15 +4691,22 @@
             </a:ln>
           </p:spPr>
           <p:style>
-            <a:lnRef idx="0"/>
-            <a:fillRef idx="0"/>
-            <a:effectRef idx="0"/>
+            <a:lnRef idx="0">
+              <a:scrgbClr r="0" g="0" b="0"/>
+            </a:lnRef>
+            <a:fillRef idx="0">
+              <a:scrgbClr r="0" g="0" b="0"/>
+            </a:fillRef>
+            <a:effectRef idx="0">
+              <a:scrgbClr r="0" g="0" b="0"/>
+            </a:effectRef>
             <a:fontRef idx="minor"/>
           </p:style>
           <p:txBody>
-            <a:bodyPr wrap="none" lIns="90000" rIns="90000" tIns="45000" bIns="45000">
+            <a:bodyPr wrap="none" lIns="90000" tIns="45000" rIns="90000" bIns="45000">
               <a:spAutoFit/>
             </a:bodyPr>
+            <a:lstStyle/>
             <a:p>
               <a:pPr>
                 <a:lnSpc>
@@ -3936,7 +4714,7 @@
                 </a:lnSpc>
               </a:pPr>
               <a:r>
-                <a:rPr b="0" lang="en-US" sz="1150" spc="-1" strike="noStrike">
+                <a:rPr lang="en-US" sz="1150" b="0" strike="noStrike" spc="-1">
                   <a:solidFill>
                     <a:srgbClr val="000000"/>
                   </a:solidFill>
@@ -3944,7 +4722,7 @@
                 </a:rPr>
                 <a:t>SDN-Controller</a:t>
               </a:r>
-              <a:endParaRPr b="0" lang="en-US" sz="1150" spc="-1" strike="noStrike">
+              <a:endParaRPr lang="en-US" sz="1150" b="0" strike="noStrike" spc="-1">
                 <a:latin typeface="Arial"/>
               </a:endParaRPr>
             </a:p>
@@ -3955,24 +4733,15 @@
                 </a:lnSpc>
               </a:pPr>
               <a:r>
-                <a:rPr b="0" lang="en-US" sz="1150" spc="-1" strike="noStrike">
+                <a:rPr lang="en-US" sz="1150" b="0" strike="noStrike" spc="-1">
                   <a:solidFill>
                     <a:srgbClr val="000000"/>
                   </a:solidFill>
                   <a:latin typeface="Calibri"/>
                 </a:rPr>
-                <a:t>  </a:t>
+                <a:t>  SDN-Orchestrator</a:t>
               </a:r>
-              <a:r>
-                <a:rPr b="0" lang="en-US" sz="1150" spc="-1" strike="noStrike">
-                  <a:solidFill>
-                    <a:srgbClr val="000000"/>
-                  </a:solidFill>
-                  <a:latin typeface="Calibri"/>
-                </a:rPr>
-                <a:t>SDN-Orchestrator</a:t>
-              </a:r>
-              <a:endParaRPr b="0" lang="en-US" sz="1150" spc="-1" strike="noStrike">
+              <a:endParaRPr lang="en-US" sz="1150" b="0" strike="noStrike" spc="-1">
                 <a:latin typeface="Arial"/>
               </a:endParaRPr>
             </a:p>
@@ -3983,24 +4752,15 @@
                 </a:lnSpc>
               </a:pPr>
               <a:r>
-                <a:rPr b="0" lang="en-US" sz="1150" spc="-1" strike="noStrike">
+                <a:rPr lang="en-US" sz="1150" b="0" strike="noStrike" spc="-1">
                   <a:solidFill>
                     <a:srgbClr val="000000"/>
                   </a:solidFill>
                   <a:latin typeface="Calibri"/>
                 </a:rPr>
-                <a:t>   </a:t>
+                <a:t>   SDN-Developer</a:t>
               </a:r>
-              <a:r>
-                <a:rPr b="0" lang="en-US" sz="1150" spc="-1" strike="noStrike">
-                  <a:solidFill>
-                    <a:srgbClr val="000000"/>
-                  </a:solidFill>
-                  <a:latin typeface="Calibri"/>
-                </a:rPr>
-                <a:t>SDN-Developer</a:t>
-              </a:r>
-              <a:endParaRPr b="0" lang="en-US" sz="1150" spc="-1" strike="noStrike">
+              <a:endParaRPr lang="en-US" sz="1150" b="0" strike="noStrike" spc="-1">
                 <a:latin typeface="Arial"/>
               </a:endParaRPr>
             </a:p>
@@ -4011,24 +4771,15 @@
                 </a:lnSpc>
               </a:pPr>
               <a:r>
-                <a:rPr b="0" lang="en-US" sz="1150" spc="-1" strike="noStrike">
+                <a:rPr lang="en-US" sz="1150" b="0" strike="noStrike" spc="-1">
                   <a:solidFill>
                     <a:srgbClr val="000000"/>
                   </a:solidFill>
                   <a:latin typeface="Calibri"/>
                 </a:rPr>
-                <a:t>    </a:t>
+                <a:t>    Data Analyst</a:t>
               </a:r>
-              <a:r>
-                <a:rPr b="0" lang="en-US" sz="1150" spc="-1" strike="noStrike">
-                  <a:solidFill>
-                    <a:srgbClr val="000000"/>
-                  </a:solidFill>
-                  <a:latin typeface="Calibri"/>
-                </a:rPr>
-                <a:t>Data Analyst</a:t>
-              </a:r>
-              <a:endParaRPr b="0" lang="en-US" sz="1150" spc="-1" strike="noStrike">
+              <a:endParaRPr lang="en-US" sz="1150" b="0" strike="noStrike" spc="-1">
                 <a:latin typeface="Arial"/>
               </a:endParaRPr>
             </a:p>
@@ -4039,24 +4790,15 @@
                 </a:lnSpc>
               </a:pPr>
               <a:r>
-                <a:rPr b="0" lang="en-US" sz="1150" spc="-1" strike="noStrike">
+                <a:rPr lang="en-US" sz="1150" b="0" strike="noStrike" spc="-1">
                   <a:solidFill>
                     <a:srgbClr val="000000"/>
                   </a:solidFill>
                   <a:latin typeface="Calibri"/>
                 </a:rPr>
-                <a:t>     </a:t>
+                <a:t>     Network operator</a:t>
               </a:r>
-              <a:r>
-                <a:rPr b="0" lang="en-US" sz="1150" spc="-1" strike="noStrike">
-                  <a:solidFill>
-                    <a:srgbClr val="000000"/>
-                  </a:solidFill>
-                  <a:latin typeface="Calibri"/>
-                </a:rPr>
-                <a:t>Network operator</a:t>
-              </a:r>
-              <a:endParaRPr b="0" lang="en-US" sz="1150" spc="-1" strike="noStrike">
+              <a:endParaRPr lang="en-US" sz="1150" b="0" strike="noStrike" spc="-1">
                 <a:latin typeface="Arial"/>
               </a:endParaRPr>
             </a:p>
@@ -4067,24 +4809,15 @@
                 </a:lnSpc>
               </a:pPr>
               <a:r>
-                <a:rPr b="0" lang="en-US" sz="1150" spc="-1" strike="noStrike">
+                <a:rPr lang="en-US" sz="1150" b="0" strike="noStrike" spc="-1">
                   <a:solidFill>
                     <a:srgbClr val="000000"/>
                   </a:solidFill>
                   <a:latin typeface="Calibri"/>
                 </a:rPr>
-                <a:t>     </a:t>
+                <a:t>     Security Expert</a:t>
               </a:r>
-              <a:r>
-                <a:rPr b="0" lang="en-US" sz="1150" spc="-1" strike="noStrike">
-                  <a:solidFill>
-                    <a:srgbClr val="000000"/>
-                  </a:solidFill>
-                  <a:latin typeface="Calibri"/>
-                </a:rPr>
-                <a:t>Security Expert</a:t>
-              </a:r>
-              <a:endParaRPr b="0" lang="en-US" sz="1150" spc="-1" strike="noStrike">
+              <a:endParaRPr lang="en-US" sz="1150" b="0" strike="noStrike" spc="-1">
                 <a:latin typeface="Arial"/>
               </a:endParaRPr>
             </a:p>
@@ -4144,15 +4877,22 @@
             </a:ln>
           </p:spPr>
           <p:style>
-            <a:lnRef idx="0"/>
-            <a:fillRef idx="0"/>
-            <a:effectRef idx="0"/>
+            <a:lnRef idx="0">
+              <a:scrgbClr r="0" g="0" b="0"/>
+            </a:lnRef>
+            <a:fillRef idx="0">
+              <a:scrgbClr r="0" g="0" b="0"/>
+            </a:fillRef>
+            <a:effectRef idx="0">
+              <a:scrgbClr r="0" g="0" b="0"/>
+            </a:effectRef>
             <a:fontRef idx="minor"/>
           </p:style>
           <p:txBody>
-            <a:bodyPr wrap="none" lIns="90000" rIns="90000" tIns="45000" bIns="45000">
+            <a:bodyPr wrap="none" lIns="90000" tIns="45000" rIns="90000" bIns="45000">
               <a:spAutoFit/>
             </a:bodyPr>
+            <a:lstStyle/>
             <a:p>
               <a:pPr>
                 <a:lnSpc>
@@ -4160,7 +4900,7 @@
                 </a:lnSpc>
               </a:pPr>
               <a:r>
-                <a:rPr b="0" lang="en-US" sz="1150" spc="-1" strike="noStrike">
+                <a:rPr lang="en-US" sz="1150" b="0" strike="noStrike" spc="-1">
                   <a:solidFill>
                     <a:srgbClr val="000000"/>
                   </a:solidFill>
@@ -4168,7 +4908,7 @@
                 </a:rPr>
                 <a:t>In-network intelligence</a:t>
               </a:r>
-              <a:endParaRPr b="0" lang="en-US" sz="1150" spc="-1" strike="noStrike">
+              <a:endParaRPr lang="en-US" sz="1150" b="0" strike="noStrike" spc="-1">
                 <a:latin typeface="Arial"/>
               </a:endParaRPr>
             </a:p>
@@ -4194,15 +4934,22 @@
             </a:ln>
           </p:spPr>
           <p:style>
-            <a:lnRef idx="0"/>
-            <a:fillRef idx="0"/>
-            <a:effectRef idx="0"/>
+            <a:lnRef idx="0">
+              <a:scrgbClr r="0" g="0" b="0"/>
+            </a:lnRef>
+            <a:fillRef idx="0">
+              <a:scrgbClr r="0" g="0" b="0"/>
+            </a:fillRef>
+            <a:effectRef idx="0">
+              <a:scrgbClr r="0" g="0" b="0"/>
+            </a:effectRef>
             <a:fontRef idx="minor"/>
           </p:style>
           <p:txBody>
-            <a:bodyPr wrap="none" lIns="90000" rIns="90000" tIns="45000" bIns="45000">
+            <a:bodyPr wrap="none" lIns="90000" tIns="45000" rIns="90000" bIns="45000">
               <a:spAutoFit/>
             </a:bodyPr>
+            <a:lstStyle/>
             <a:p>
               <a:pPr>
                 <a:lnSpc>
@@ -4210,7 +4957,7 @@
                 </a:lnSpc>
               </a:pPr>
               <a:r>
-                <a:rPr b="0" lang="en-US" sz="1600" spc="-1" strike="noStrike">
+                <a:rPr lang="en-US" sz="1600" b="0" strike="noStrike" spc="-1">
                   <a:solidFill>
                     <a:srgbClr val="000000"/>
                   </a:solidFill>
@@ -4218,7 +4965,7 @@
                 </a:rPr>
                 <a:t>ANIMA</a:t>
               </a:r>
-              <a:endParaRPr b="0" lang="en-US" sz="1600" spc="-1" strike="noStrike">
+              <a:endParaRPr lang="en-US" sz="1600" b="0" strike="noStrike" spc="-1">
                 <a:latin typeface="Arial"/>
               </a:endParaRPr>
             </a:p>
@@ -4227,14 +4974,579 @@
       </p:grpSp>
     </p:spTree>
   </p:cSld>
-  <mc:AlternateContent>
+  <p:clrMapOvr>
+    <a:masterClrMapping/>
+  </p:clrMapOvr>
+  <mc:AlternateContent xmlns:mc="http://schemas.openxmlformats.org/markup-compatibility/2006" xmlns:p14="http://schemas.microsoft.com/office/powerpoint/2010/main">
     <mc:Choice Requires="p14">
       <p:transition spd="slow" p14:dur="2000"/>
     </mc:Choice>
-    <mc:Fallback>
+    <mc:Fallback xmlns:p15="http://schemas.microsoft.com/office/powerpoint/2012/main" xmlns="">
       <p:transition spd="slow"/>
     </mc:Fallback>
   </mc:AlternateContent>
+</p:sld>
+</file>
+
+<file path=ppt/slides/slide2.xml><?xml version="1.0" encoding="utf-8"?>
+<p:sld xmlns:a="http://schemas.openxmlformats.org/drawingml/2006/main" xmlns:r="http://schemas.openxmlformats.org/officeDocument/2006/relationships" xmlns:p="http://schemas.openxmlformats.org/presentationml/2006/main">
+  <p:cSld>
+    <p:spTree>
+      <p:nvGrpSpPr>
+        <p:cNvPr id="1" name=""/>
+        <p:cNvGrpSpPr/>
+        <p:nvPr/>
+      </p:nvGrpSpPr>
+      <p:grpSpPr>
+        <a:xfrm>
+          <a:off x="0" y="0"/>
+          <a:ext cx="0" cy="0"/>
+          <a:chOff x="0" y="0"/>
+          <a:chExt cx="0" cy="0"/>
+        </a:xfrm>
+      </p:grpSpPr>
+      <p:grpSp>
+        <p:nvGrpSpPr>
+          <p:cNvPr id="3" name="Group 2"/>
+          <p:cNvGrpSpPr/>
+          <p:nvPr/>
+        </p:nvGrpSpPr>
+        <p:grpSpPr>
+          <a:xfrm>
+            <a:off x="147571" y="681661"/>
+            <a:ext cx="7459717" cy="3288106"/>
+            <a:chOff x="147571" y="681661"/>
+            <a:chExt cx="7459717" cy="3288106"/>
+          </a:xfrm>
+        </p:grpSpPr>
+        <p:pic>
+          <p:nvPicPr>
+            <p:cNvPr id="2" name="Picture 1"/>
+            <p:cNvPicPr>
+              <a:picLocks noChangeAspect="1"/>
+            </p:cNvPicPr>
+            <p:nvPr/>
+          </p:nvPicPr>
+          <p:blipFill>
+            <a:blip r:embed="rId2">
+              <a:extLst>
+                <a:ext uri="{28A0092B-C50C-407E-A947-70E740481C1C}">
+                  <a14:useLocalDpi xmlns:a14="http://schemas.microsoft.com/office/drawing/2010/main" val="0"/>
+                </a:ext>
+              </a:extLst>
+            </a:blip>
+            <a:stretch>
+              <a:fillRect/>
+            </a:stretch>
+          </p:blipFill>
+          <p:spPr>
+            <a:xfrm>
+              <a:off x="147571" y="824734"/>
+              <a:ext cx="2907018" cy="2900911"/>
+            </a:xfrm>
+            <a:prstGeom prst="rect">
+              <a:avLst/>
+            </a:prstGeom>
+          </p:spPr>
+        </p:pic>
+        <p:grpSp>
+          <p:nvGrpSpPr>
+            <p:cNvPr id="14" name="Group 13"/>
+            <p:cNvGrpSpPr/>
+            <p:nvPr/>
+          </p:nvGrpSpPr>
+          <p:grpSpPr>
+            <a:xfrm>
+              <a:off x="774983" y="681661"/>
+              <a:ext cx="6832305" cy="3288106"/>
+              <a:chOff x="774983" y="681661"/>
+              <a:chExt cx="6832305" cy="3288106"/>
+            </a:xfrm>
+          </p:grpSpPr>
+          <p:pic>
+            <p:nvPicPr>
+              <p:cNvPr id="12" name="Picture 11"/>
+              <p:cNvPicPr>
+                <a:picLocks noChangeAspect="1"/>
+              </p:cNvPicPr>
+              <p:nvPr/>
+            </p:nvPicPr>
+            <p:blipFill>
+              <a:blip r:embed="rId3">
+                <a:extLst>
+                  <a:ext uri="{28A0092B-C50C-407E-A947-70E740481C1C}">
+                    <a14:useLocalDpi xmlns:a14="http://schemas.microsoft.com/office/drawing/2010/main" val="0"/>
+                  </a:ext>
+                </a:extLst>
+              </a:blip>
+              <a:stretch>
+                <a:fillRect/>
+              </a:stretch>
+            </p:blipFill>
+            <p:spPr>
+              <a:xfrm>
+                <a:off x="4038073" y="1218928"/>
+                <a:ext cx="3569215" cy="2381507"/>
+              </a:xfrm>
+              <a:prstGeom prst="rect">
+                <a:avLst/>
+              </a:prstGeom>
+            </p:spPr>
+          </p:pic>
+          <p:sp>
+            <p:nvSpPr>
+              <p:cNvPr id="8" name="TextBox 7"/>
+              <p:cNvSpPr txBox="1"/>
+              <p:nvPr/>
+            </p:nvSpPr>
+            <p:spPr>
+              <a:xfrm>
+                <a:off x="1247699" y="681661"/>
+                <a:ext cx="2217274" cy="1569660"/>
+              </a:xfrm>
+              <a:prstGeom prst="rect">
+                <a:avLst/>
+              </a:prstGeom>
+              <a:noFill/>
+            </p:spPr>
+            <p:txBody>
+              <a:bodyPr wrap="none" rtlCol="0">
+                <a:spAutoFit/>
+              </a:bodyPr>
+              <a:lstStyle/>
+              <a:p>
+                <a:r>
+                  <a:rPr lang="en-US" sz="1600">
+                    <a:solidFill>
+                      <a:schemeClr val="accent1">
+                        <a:lumMod val="50000"/>
+                      </a:schemeClr>
+                    </a:solidFill>
+                    <a:latin typeface="Comic Sans MS" charset="0"/>
+                    <a:ea typeface="Comic Sans MS" charset="0"/>
+                    <a:cs typeface="Comic Sans MS" charset="0"/>
+                  </a:rPr>
+                  <a:t>SDN-Controller</a:t>
+                </a:r>
+              </a:p>
+              <a:p>
+                <a:r>
+                  <a:rPr lang="en-US" sz="1600">
+                    <a:solidFill>
+                      <a:schemeClr val="accent1">
+                        <a:lumMod val="50000"/>
+                      </a:schemeClr>
+                    </a:solidFill>
+                    <a:latin typeface="Comic Sans MS" charset="0"/>
+                    <a:ea typeface="Comic Sans MS" charset="0"/>
+                    <a:cs typeface="Comic Sans MS" charset="0"/>
+                  </a:rPr>
+                  <a:t>  SDN-Orchestrator</a:t>
+                </a:r>
+              </a:p>
+              <a:p>
+                <a:r>
+                  <a:rPr lang="en-US" sz="1600">
+                    <a:solidFill>
+                      <a:schemeClr val="accent1">
+                        <a:lumMod val="50000"/>
+                      </a:schemeClr>
+                    </a:solidFill>
+                    <a:latin typeface="Comic Sans MS" charset="0"/>
+                    <a:ea typeface="Comic Sans MS" charset="0"/>
+                    <a:cs typeface="Comic Sans MS" charset="0"/>
+                  </a:rPr>
+                  <a:t>   SDN-Developer</a:t>
+                </a:r>
+              </a:p>
+              <a:p>
+                <a:r>
+                  <a:rPr lang="en-US" sz="1600">
+                    <a:solidFill>
+                      <a:schemeClr val="accent1">
+                        <a:lumMod val="50000"/>
+                      </a:schemeClr>
+                    </a:solidFill>
+                    <a:latin typeface="Comic Sans MS" charset="0"/>
+                    <a:ea typeface="Comic Sans MS" charset="0"/>
+                    <a:cs typeface="Comic Sans MS" charset="0"/>
+                  </a:rPr>
+                  <a:t>    Data Analyst</a:t>
+                </a:r>
+              </a:p>
+              <a:p>
+                <a:r>
+                  <a:rPr lang="en-US" sz="1600">
+                    <a:solidFill>
+                      <a:schemeClr val="accent1">
+                        <a:lumMod val="50000"/>
+                      </a:schemeClr>
+                    </a:solidFill>
+                    <a:latin typeface="Comic Sans MS" charset="0"/>
+                    <a:ea typeface="Comic Sans MS" charset="0"/>
+                    <a:cs typeface="Comic Sans MS" charset="0"/>
+                  </a:rPr>
+                  <a:t>     Network operator</a:t>
+                </a:r>
+              </a:p>
+              <a:p>
+                <a:r>
+                  <a:rPr lang="en-US" sz="1600">
+                    <a:solidFill>
+                      <a:schemeClr val="accent1">
+                        <a:lumMod val="50000"/>
+                      </a:schemeClr>
+                    </a:solidFill>
+                    <a:latin typeface="Comic Sans MS" charset="0"/>
+                    <a:ea typeface="Comic Sans MS" charset="0"/>
+                    <a:cs typeface="Comic Sans MS" charset="0"/>
+                  </a:rPr>
+                  <a:t>     Security Expert</a:t>
+                </a:r>
+              </a:p>
+            </p:txBody>
+          </p:sp>
+          <p:sp>
+            <p:nvSpPr>
+              <p:cNvPr id="9" name="Right Arrow 8"/>
+              <p:cNvSpPr/>
+              <p:nvPr/>
+            </p:nvSpPr>
+            <p:spPr>
+              <a:xfrm>
+                <a:off x="2112961" y="2512262"/>
+                <a:ext cx="1894501" cy="235974"/>
+              </a:xfrm>
+              <a:prstGeom prst="rightArrow">
+                <a:avLst>
+                  <a:gd name="adj1" fmla="val 56249"/>
+                  <a:gd name="adj2" fmla="val 50000"/>
+                </a:avLst>
+              </a:prstGeom>
+              <a:gradFill flip="none" rotWithShape="1">
+                <a:gsLst>
+                  <a:gs pos="0">
+                    <a:schemeClr val="accent1">
+                      <a:shade val="30000"/>
+                      <a:satMod val="115000"/>
+                    </a:schemeClr>
+                  </a:gs>
+                  <a:gs pos="50000">
+                    <a:schemeClr val="accent1">
+                      <a:shade val="67500"/>
+                      <a:satMod val="115000"/>
+                    </a:schemeClr>
+                  </a:gs>
+                  <a:gs pos="100000">
+                    <a:schemeClr val="accent1">
+                      <a:shade val="100000"/>
+                      <a:satMod val="115000"/>
+                    </a:schemeClr>
+                  </a:gs>
+                </a:gsLst>
+                <a:lin ang="5400000" scaled="1"/>
+                <a:tileRect/>
+              </a:gradFill>
+            </p:spPr>
+            <p:style>
+              <a:lnRef idx="2">
+                <a:schemeClr val="accent1">
+                  <a:shade val="50000"/>
+                </a:schemeClr>
+              </a:lnRef>
+              <a:fillRef idx="1">
+                <a:schemeClr val="accent1"/>
+              </a:fillRef>
+              <a:effectRef idx="0">
+                <a:schemeClr val="accent1"/>
+              </a:effectRef>
+              <a:fontRef idx="minor">
+                <a:schemeClr val="lt1"/>
+              </a:fontRef>
+            </p:style>
+            <p:txBody>
+              <a:bodyPr rtlCol="0" anchor="ctr"/>
+              <a:lstStyle/>
+              <a:p>
+                <a:pPr algn="ctr"/>
+                <a:endParaRPr lang="en-US"/>
+              </a:p>
+            </p:txBody>
+          </p:sp>
+          <p:sp>
+            <p:nvSpPr>
+              <p:cNvPr id="10" name="TextBox 9"/>
+              <p:cNvSpPr txBox="1"/>
+              <p:nvPr/>
+            </p:nvSpPr>
+            <p:spPr>
+              <a:xfrm>
+                <a:off x="1939084" y="2282721"/>
+                <a:ext cx="2209259" cy="307777"/>
+              </a:xfrm>
+              <a:prstGeom prst="rect">
+                <a:avLst/>
+              </a:prstGeom>
+              <a:noFill/>
+            </p:spPr>
+            <p:txBody>
+              <a:bodyPr wrap="none" rtlCol="0">
+                <a:spAutoFit/>
+              </a:bodyPr>
+              <a:lstStyle/>
+              <a:p>
+                <a:r>
+                  <a:rPr lang="en-US" sz="1400" b="1">
+                    <a:solidFill>
+                      <a:schemeClr val="accent1">
+                        <a:lumMod val="50000"/>
+                      </a:schemeClr>
+                    </a:solidFill>
+                    <a:latin typeface="Comic Sans MS" charset="0"/>
+                    <a:ea typeface="Comic Sans MS" charset="0"/>
+                    <a:cs typeface="Comic Sans MS" charset="0"/>
+                  </a:rPr>
+                  <a:t>In-network intelligence</a:t>
+                </a:r>
+              </a:p>
+            </p:txBody>
+          </p:sp>
+          <p:sp>
+            <p:nvSpPr>
+              <p:cNvPr id="13" name="Rectangle 12"/>
+              <p:cNvSpPr/>
+              <p:nvPr/>
+            </p:nvSpPr>
+            <p:spPr>
+              <a:xfrm>
+                <a:off x="2454775" y="2657244"/>
+                <a:ext cx="1420581" cy="584775"/>
+              </a:xfrm>
+              <a:prstGeom prst="rect">
+                <a:avLst/>
+              </a:prstGeom>
+              <a:noFill/>
+            </p:spPr>
+            <p:txBody>
+              <a:bodyPr wrap="none" lIns="91440" tIns="45720" rIns="91440" bIns="45720">
+                <a:spAutoFit/>
+              </a:bodyPr>
+              <a:lstStyle/>
+              <a:p>
+                <a:pPr algn="ctr"/>
+                <a:r>
+                  <a:rPr lang="en-US" sz="3200" b="1" cap="none" spc="0">
+                    <a:ln w="12700">
+                      <a:solidFill>
+                        <a:schemeClr val="accent1"/>
+                      </a:solidFill>
+                      <a:prstDash val="solid"/>
+                    </a:ln>
+                    <a:pattFill prst="pct50">
+                      <a:fgClr>
+                        <a:schemeClr val="accent1"/>
+                      </a:fgClr>
+                      <a:bgClr>
+                        <a:schemeClr val="accent1">
+                          <a:lumMod val="20000"/>
+                          <a:lumOff val="80000"/>
+                        </a:schemeClr>
+                      </a:bgClr>
+                    </a:pattFill>
+                    <a:effectLst>
+                      <a:outerShdw dist="38100" dir="2640000" algn="bl" rotWithShape="0">
+                        <a:schemeClr val="accent1"/>
+                      </a:outerShdw>
+                    </a:effectLst>
+                  </a:rPr>
+                  <a:t>ANIMA</a:t>
+                </a:r>
+              </a:p>
+            </p:txBody>
+          </p:sp>
+          <p:sp>
+            <p:nvSpPr>
+              <p:cNvPr id="16" name="TextBox 15"/>
+              <p:cNvSpPr txBox="1"/>
+              <p:nvPr/>
+            </p:nvSpPr>
+            <p:spPr>
+              <a:xfrm>
+                <a:off x="3061661" y="3600435"/>
+                <a:ext cx="2735044" cy="369332"/>
+              </a:xfrm>
+              <a:prstGeom prst="rect">
+                <a:avLst/>
+              </a:prstGeom>
+              <a:noFill/>
+            </p:spPr>
+            <p:txBody>
+              <a:bodyPr wrap="none" rtlCol="0">
+                <a:spAutoFit/>
+              </a:bodyPr>
+              <a:lstStyle/>
+              <a:p>
+                <a:r>
+                  <a:rPr lang="en-US" sz="1800">
+                    <a:solidFill>
+                      <a:schemeClr val="accent1">
+                        <a:lumMod val="50000"/>
+                      </a:schemeClr>
+                    </a:solidFill>
+                    <a:latin typeface="Comic Sans MS" charset="0"/>
+                    <a:ea typeface="Comic Sans MS" charset="0"/>
+                    <a:cs typeface="Comic Sans MS" charset="0"/>
+                  </a:rPr>
+                  <a:t>If networks where cars</a:t>
+                </a:r>
+              </a:p>
+            </p:txBody>
+          </p:sp>
+          <p:sp>
+            <p:nvSpPr>
+              <p:cNvPr id="18" name="TextBox 17"/>
+              <p:cNvSpPr txBox="1"/>
+              <p:nvPr/>
+            </p:nvSpPr>
+            <p:spPr>
+              <a:xfrm>
+                <a:off x="774983" y="3537555"/>
+                <a:ext cx="1164101" cy="268984"/>
+              </a:xfrm>
+              <a:prstGeom prst="rect">
+                <a:avLst/>
+              </a:prstGeom>
+              <a:noFill/>
+            </p:spPr>
+            <p:txBody>
+              <a:bodyPr wrap="none" rtlCol="0">
+                <a:spAutoFit/>
+              </a:bodyPr>
+              <a:lstStyle/>
+              <a:p>
+                <a:r>
+                  <a:rPr lang="en-US">
+                    <a:solidFill>
+                      <a:schemeClr val="accent1">
+                        <a:lumMod val="50000"/>
+                      </a:schemeClr>
+                    </a:solidFill>
+                    <a:latin typeface="Comic Sans MS" charset="0"/>
+                    <a:ea typeface="Comic Sans MS" charset="0"/>
+                    <a:cs typeface="Comic Sans MS" charset="0"/>
+                  </a:rPr>
+                  <a:t>“Self Driving”</a:t>
+                </a:r>
+              </a:p>
+            </p:txBody>
+          </p:sp>
+        </p:grpSp>
+      </p:grpSp>
+    </p:spTree>
+    <p:extLst>
+      <p:ext uri="{BB962C8B-B14F-4D97-AF65-F5344CB8AC3E}">
+        <p14:creationId xmlns:p14="http://schemas.microsoft.com/office/powerpoint/2010/main" val="48880688"/>
+      </p:ext>
+    </p:extLst>
+  </p:cSld>
+  <p:clrMapOvr>
+    <a:masterClrMapping/>
+  </p:clrMapOvr>
+</p:sld>
+</file>
+
+<file path=ppt/slides/slide3.xml><?xml version="1.0" encoding="utf-8"?>
+<p:sld xmlns:a="http://schemas.openxmlformats.org/drawingml/2006/main" xmlns:r="http://schemas.openxmlformats.org/officeDocument/2006/relationships" xmlns:p="http://schemas.openxmlformats.org/presentationml/2006/main">
+  <p:cSld>
+    <p:spTree>
+      <p:nvGrpSpPr>
+        <p:cNvPr id="1" name=""/>
+        <p:cNvGrpSpPr/>
+        <p:nvPr/>
+      </p:nvGrpSpPr>
+      <p:grpSpPr>
+        <a:xfrm>
+          <a:off x="0" y="0"/>
+          <a:ext cx="0" cy="0"/>
+          <a:chOff x="0" y="0"/>
+          <a:chExt cx="0" cy="0"/>
+        </a:xfrm>
+      </p:grpSpPr>
+      <p:pic>
+        <p:nvPicPr>
+          <p:cNvPr id="4" name="Picture 3"/>
+          <p:cNvPicPr>
+            <a:picLocks noChangeAspect="1"/>
+          </p:cNvPicPr>
+          <p:nvPr/>
+        </p:nvPicPr>
+        <p:blipFill>
+          <a:blip r:embed="rId2">
+            <a:extLst>
+              <a:ext uri="{28A0092B-C50C-407E-A947-70E740481C1C}">
+                <a14:useLocalDpi xmlns:a14="http://schemas.microsoft.com/office/drawing/2010/main" val="0"/>
+              </a:ext>
+            </a:extLst>
+          </a:blip>
+          <a:stretch>
+            <a:fillRect/>
+          </a:stretch>
+        </p:blipFill>
+        <p:spPr>
+          <a:xfrm>
+            <a:off x="0" y="330200"/>
+            <a:ext cx="7772400" cy="3716179"/>
+          </a:xfrm>
+          <a:prstGeom prst="rect">
+            <a:avLst/>
+          </a:prstGeom>
+        </p:spPr>
+      </p:pic>
+      <p:sp>
+        <p:nvSpPr>
+          <p:cNvPr id="5" name="TextBox 4"/>
+          <p:cNvSpPr txBox="1"/>
+          <p:nvPr/>
+        </p:nvSpPr>
+        <p:spPr>
+          <a:xfrm>
+            <a:off x="592667" y="93133"/>
+            <a:ext cx="4065537" cy="430887"/>
+          </a:xfrm>
+          <a:prstGeom prst="rect">
+            <a:avLst/>
+          </a:prstGeom>
+          <a:noFill/>
+        </p:spPr>
+        <p:txBody>
+          <a:bodyPr wrap="none" rtlCol="0">
+            <a:spAutoFit/>
+          </a:bodyPr>
+          <a:lstStyle/>
+          <a:p>
+            <a:r>
+              <a:rPr lang="en-US" sz="1100"/>
+              <a:t>Sometimes powerpoint is bad exporting pictures,</a:t>
+            </a:r>
+          </a:p>
+          <a:p>
+            <a:r>
+              <a:rPr lang="en-US" sz="1100"/>
+              <a:t>The picture below is png of screendump, so it is 100% correct.</a:t>
+            </a:r>
+          </a:p>
+        </p:txBody>
+      </p:sp>
+    </p:spTree>
+    <p:extLst>
+      <p:ext uri="{BB962C8B-B14F-4D97-AF65-F5344CB8AC3E}">
+        <p14:creationId xmlns:p14="http://schemas.microsoft.com/office/powerpoint/2010/main" val="1079285129"/>
+      </p:ext>
+    </p:extLst>
+  </p:cSld>
+  <p:clrMapOvr>
+    <a:masterClrMapping/>
+  </p:clrMapOvr>
 </p:sld>
 </file>
 
@@ -4249,34 +5561,34 @@
         <a:sysClr val="window" lastClr="FFFFFF"/>
       </a:lt1>
       <a:dk2>
-        <a:srgbClr val="44546a"/>
+        <a:srgbClr val="44546A"/>
       </a:dk2>
       <a:lt2>
-        <a:srgbClr val="e7e6e6"/>
+        <a:srgbClr val="E7E6E6"/>
       </a:lt2>
       <a:accent1>
-        <a:srgbClr val="5b9bd5"/>
+        <a:srgbClr val="5B9BD5"/>
       </a:accent1>
       <a:accent2>
-        <a:srgbClr val="ed7d31"/>
+        <a:srgbClr val="ED7D31"/>
       </a:accent2>
       <a:accent3>
-        <a:srgbClr val="a5a5a5"/>
+        <a:srgbClr val="A5A5A5"/>
       </a:accent3>
       <a:accent4>
-        <a:srgbClr val="ffc000"/>
+        <a:srgbClr val="FFC000"/>
       </a:accent4>
       <a:accent5>
-        <a:srgbClr val="4472c4"/>
+        <a:srgbClr val="4472C4"/>
       </a:accent5>
       <a:accent6>
-        <a:srgbClr val="70ad47"/>
+        <a:srgbClr val="70AD47"/>
       </a:accent6>
       <a:hlink>
-        <a:srgbClr val="0563c1"/>
+        <a:srgbClr val="0563C1"/>
       </a:hlink>
       <a:folHlink>
-        <a:srgbClr val="954f72"/>
+        <a:srgbClr val="954F72"/>
       </a:folHlink>
     </a:clrScheme>
     <a:fontScheme name="Office">
@@ -4461,6 +5773,8 @@
       </a:bgFillStyleLst>
     </a:fmtScheme>
   </a:themeElements>
+  <a:objectDefaults/>
+  <a:extraClrSchemeLst/>
 </a:theme>
 </file>
 
@@ -4475,34 +5789,34 @@
         <a:sysClr val="window" lastClr="FFFFFF"/>
       </a:lt1>
       <a:dk2>
-        <a:srgbClr val="44546a"/>
+        <a:srgbClr val="44546A"/>
       </a:dk2>
       <a:lt2>
-        <a:srgbClr val="e7e6e6"/>
+        <a:srgbClr val="E7E6E6"/>
       </a:lt2>
       <a:accent1>
-        <a:srgbClr val="5b9bd5"/>
+        <a:srgbClr val="5B9BD5"/>
       </a:accent1>
       <a:accent2>
-        <a:srgbClr val="ed7d31"/>
+        <a:srgbClr val="ED7D31"/>
       </a:accent2>
       <a:accent3>
-        <a:srgbClr val="a5a5a5"/>
+        <a:srgbClr val="A5A5A5"/>
       </a:accent3>
       <a:accent4>
-        <a:srgbClr val="ffc000"/>
+        <a:srgbClr val="FFC000"/>
       </a:accent4>
       <a:accent5>
-        <a:srgbClr val="4472c4"/>
+        <a:srgbClr val="4472C4"/>
       </a:accent5>
       <a:accent6>
-        <a:srgbClr val="70ad47"/>
+        <a:srgbClr val="70AD47"/>
       </a:accent6>
       <a:hlink>
-        <a:srgbClr val="0563c1"/>
+        <a:srgbClr val="0563C1"/>
       </a:hlink>
       <a:folHlink>
-        <a:srgbClr val="954f72"/>
+        <a:srgbClr val="954F72"/>
       </a:folHlink>
     </a:clrScheme>
     <a:fontScheme name="Office">
@@ -4687,5 +6001,7 @@
       </a:bgFillStyleLst>
     </a:fmtScheme>
   </a:themeElements>
+  <a:objectDefaults/>
+  <a:extraClrSchemeLst/>
 </a:theme>
 </file>
</xml_diff>